<commit_message>
Added draft of MDTP orientation talk
</commit_message>
<xml_diff>
--- a/info/20170830-MDTPorientation.pptx
+++ b/info/20170830-MDTPorientation.pptx
@@ -4,11 +4,19 @@
   <p:sldMasterIdLst>
     <p:sldMasterId id="2147483648" r:id="rId1"/>
   </p:sldMasterIdLst>
+  <p:notesMasterIdLst>
+    <p:notesMasterId r:id="rId11"/>
+  </p:notesMasterIdLst>
   <p:sldIdLst>
     <p:sldId id="256" r:id="rId2"/>
     <p:sldId id="257" r:id="rId3"/>
     <p:sldId id="258" r:id="rId4"/>
     <p:sldId id="259" r:id="rId5"/>
+    <p:sldId id="261" r:id="rId6"/>
+    <p:sldId id="262" r:id="rId7"/>
+    <p:sldId id="263" r:id="rId8"/>
+    <p:sldId id="264" r:id="rId9"/>
+    <p:sldId id="265" r:id="rId10"/>
   </p:sldIdLst>
   <p:sldSz cx="9144000" cy="6858000" type="screen4x3"/>
   <p:notesSz cx="6858000" cy="9144000"/>
@@ -108,6 +116,356 @@
     </a:lvl9pPr>
   </p:defaultTextStyle>
 </p:presentation>
+</file>
+
+<file path=ppt/notesMasters/notesMaster1.xml><?xml version="1.0" encoding="utf-8"?>
+<p:notesMaster xmlns:a="http://schemas.openxmlformats.org/drawingml/2006/main" xmlns:r="http://schemas.openxmlformats.org/officeDocument/2006/relationships" xmlns:p="http://schemas.openxmlformats.org/presentationml/2006/main">
+  <p:cSld>
+    <p:bg>
+      <p:bgRef idx="1001">
+        <a:schemeClr val="bg1"/>
+      </p:bgRef>
+    </p:bg>
+    <p:spTree>
+      <p:nvGrpSpPr>
+        <p:cNvPr id="1" name=""/>
+        <p:cNvGrpSpPr/>
+        <p:nvPr/>
+      </p:nvGrpSpPr>
+      <p:grpSpPr>
+        <a:xfrm>
+          <a:off x="0" y="0"/>
+          <a:ext cx="0" cy="0"/>
+          <a:chOff x="0" y="0"/>
+          <a:chExt cx="0" cy="0"/>
+        </a:xfrm>
+      </p:grpSpPr>
+      <p:sp>
+        <p:nvSpPr>
+          <p:cNvPr id="2" name="Header Placeholder 1"/>
+          <p:cNvSpPr>
+            <a:spLocks noGrp="1"/>
+          </p:cNvSpPr>
+          <p:nvPr>
+            <p:ph type="hdr" sz="quarter"/>
+          </p:nvPr>
+        </p:nvSpPr>
+        <p:spPr>
+          <a:xfrm>
+            <a:off x="0" y="0"/>
+            <a:ext cx="2971800" cy="457200"/>
+          </a:xfrm>
+          <a:prstGeom prst="rect">
+            <a:avLst/>
+          </a:prstGeom>
+        </p:spPr>
+        <p:txBody>
+          <a:bodyPr vert="horz" lIns="91440" tIns="45720" rIns="91440" bIns="45720" rtlCol="0"/>
+          <a:lstStyle>
+            <a:lvl1pPr algn="l">
+              <a:defRPr sz="1200"/>
+            </a:lvl1pPr>
+          </a:lstStyle>
+          <a:p>
+            <a:endParaRPr lang="en-US"/>
+          </a:p>
+        </p:txBody>
+      </p:sp>
+      <p:sp>
+        <p:nvSpPr>
+          <p:cNvPr id="3" name="Date Placeholder 2"/>
+          <p:cNvSpPr>
+            <a:spLocks noGrp="1"/>
+          </p:cNvSpPr>
+          <p:nvPr>
+            <p:ph type="dt" idx="1"/>
+          </p:nvPr>
+        </p:nvSpPr>
+        <p:spPr>
+          <a:xfrm>
+            <a:off x="3884613" y="0"/>
+            <a:ext cx="2971800" cy="457200"/>
+          </a:xfrm>
+          <a:prstGeom prst="rect">
+            <a:avLst/>
+          </a:prstGeom>
+        </p:spPr>
+        <p:txBody>
+          <a:bodyPr vert="horz" lIns="91440" tIns="45720" rIns="91440" bIns="45720" rtlCol="0"/>
+          <a:lstStyle>
+            <a:lvl1pPr algn="r">
+              <a:defRPr sz="1200"/>
+            </a:lvl1pPr>
+          </a:lstStyle>
+          <a:p>
+            <a:fld id="{A67DFD92-C269-184E-9D9F-A8BC0EBA8EF9}" type="datetimeFigureOut">
+              <a:rPr lang="en-US" smtClean="0"/>
+              <a:t>8/15/17</a:t>
+            </a:fld>
+            <a:endParaRPr lang="en-US"/>
+          </a:p>
+        </p:txBody>
+      </p:sp>
+      <p:sp>
+        <p:nvSpPr>
+          <p:cNvPr id="4" name="Slide Image Placeholder 3"/>
+          <p:cNvSpPr>
+            <a:spLocks noGrp="1" noRot="1" noChangeAspect="1"/>
+          </p:cNvSpPr>
+          <p:nvPr>
+            <p:ph type="sldImg" idx="2"/>
+          </p:nvPr>
+        </p:nvSpPr>
+        <p:spPr>
+          <a:xfrm>
+            <a:off x="1143000" y="685800"/>
+            <a:ext cx="4572000" cy="3429000"/>
+          </a:xfrm>
+          <a:prstGeom prst="rect">
+            <a:avLst/>
+          </a:prstGeom>
+          <a:noFill/>
+          <a:ln w="12700">
+            <a:solidFill>
+              <a:prstClr val="black"/>
+            </a:solidFill>
+          </a:ln>
+        </p:spPr>
+        <p:txBody>
+          <a:bodyPr vert="horz" lIns="91440" tIns="45720" rIns="91440" bIns="45720" rtlCol="0" anchor="ctr"/>
+          <a:lstStyle/>
+          <a:p>
+            <a:endParaRPr lang="en-US"/>
+          </a:p>
+        </p:txBody>
+      </p:sp>
+      <p:sp>
+        <p:nvSpPr>
+          <p:cNvPr id="5" name="Notes Placeholder 4"/>
+          <p:cNvSpPr>
+            <a:spLocks noGrp="1"/>
+          </p:cNvSpPr>
+          <p:nvPr>
+            <p:ph type="body" sz="quarter" idx="3"/>
+          </p:nvPr>
+        </p:nvSpPr>
+        <p:spPr>
+          <a:xfrm>
+            <a:off x="685800" y="4343400"/>
+            <a:ext cx="5486400" cy="4114800"/>
+          </a:xfrm>
+          <a:prstGeom prst="rect">
+            <a:avLst/>
+          </a:prstGeom>
+        </p:spPr>
+        <p:txBody>
+          <a:bodyPr vert="horz" lIns="91440" tIns="45720" rIns="91440" bIns="45720" rtlCol="0"/>
+          <a:lstStyle/>
+          <a:p>
+            <a:pPr lvl="0"/>
+            <a:r>
+              <a:rPr lang="en-US" smtClean="0"/>
+              <a:t>Click to edit Master text styles</a:t>
+            </a:r>
+          </a:p>
+          <a:p>
+            <a:pPr lvl="1"/>
+            <a:r>
+              <a:rPr lang="en-US" smtClean="0"/>
+              <a:t>Second level</a:t>
+            </a:r>
+          </a:p>
+          <a:p>
+            <a:pPr lvl="2"/>
+            <a:r>
+              <a:rPr lang="en-US" smtClean="0"/>
+              <a:t>Third level</a:t>
+            </a:r>
+          </a:p>
+          <a:p>
+            <a:pPr lvl="3"/>
+            <a:r>
+              <a:rPr lang="en-US" smtClean="0"/>
+              <a:t>Fourth level</a:t>
+            </a:r>
+          </a:p>
+          <a:p>
+            <a:pPr lvl="4"/>
+            <a:r>
+              <a:rPr lang="en-US" smtClean="0"/>
+              <a:t>Fifth level</a:t>
+            </a:r>
+            <a:endParaRPr lang="en-US"/>
+          </a:p>
+        </p:txBody>
+      </p:sp>
+      <p:sp>
+        <p:nvSpPr>
+          <p:cNvPr id="6" name="Footer Placeholder 5"/>
+          <p:cNvSpPr>
+            <a:spLocks noGrp="1"/>
+          </p:cNvSpPr>
+          <p:nvPr>
+            <p:ph type="ftr" sz="quarter" idx="4"/>
+          </p:nvPr>
+        </p:nvSpPr>
+        <p:spPr>
+          <a:xfrm>
+            <a:off x="0" y="8685213"/>
+            <a:ext cx="2971800" cy="457200"/>
+          </a:xfrm>
+          <a:prstGeom prst="rect">
+            <a:avLst/>
+          </a:prstGeom>
+        </p:spPr>
+        <p:txBody>
+          <a:bodyPr vert="horz" lIns="91440" tIns="45720" rIns="91440" bIns="45720" rtlCol="0" anchor="b"/>
+          <a:lstStyle>
+            <a:lvl1pPr algn="l">
+              <a:defRPr sz="1200"/>
+            </a:lvl1pPr>
+          </a:lstStyle>
+          <a:p>
+            <a:endParaRPr lang="en-US"/>
+          </a:p>
+        </p:txBody>
+      </p:sp>
+      <p:sp>
+        <p:nvSpPr>
+          <p:cNvPr id="7" name="Slide Number Placeholder 6"/>
+          <p:cNvSpPr>
+            <a:spLocks noGrp="1"/>
+          </p:cNvSpPr>
+          <p:nvPr>
+            <p:ph type="sldNum" sz="quarter" idx="5"/>
+          </p:nvPr>
+        </p:nvSpPr>
+        <p:spPr>
+          <a:xfrm>
+            <a:off x="3884613" y="8685213"/>
+            <a:ext cx="2971800" cy="457200"/>
+          </a:xfrm>
+          <a:prstGeom prst="rect">
+            <a:avLst/>
+          </a:prstGeom>
+        </p:spPr>
+        <p:txBody>
+          <a:bodyPr vert="horz" lIns="91440" tIns="45720" rIns="91440" bIns="45720" rtlCol="0" anchor="b"/>
+          <a:lstStyle>
+            <a:lvl1pPr algn="r">
+              <a:defRPr sz="1200"/>
+            </a:lvl1pPr>
+          </a:lstStyle>
+          <a:p>
+            <a:fld id="{AE465083-992D-C74A-830B-0B9EFA301938}" type="slidenum">
+              <a:rPr lang="en-US" smtClean="0"/>
+              <a:t>‹#›</a:t>
+            </a:fld>
+            <a:endParaRPr lang="en-US"/>
+          </a:p>
+        </p:txBody>
+      </p:sp>
+    </p:spTree>
+    <p:extLst>
+      <p:ext uri="{BB962C8B-B14F-4D97-AF65-F5344CB8AC3E}">
+        <p14:creationId xmlns:p14="http://schemas.microsoft.com/office/powerpoint/2010/main" val="3339454952"/>
+      </p:ext>
+    </p:extLst>
+  </p:cSld>
+  <p:clrMap bg1="lt1" tx1="dk1" bg2="lt2" tx2="dk2" accent1="accent1" accent2="accent2" accent3="accent3" accent4="accent4" accent5="accent5" accent6="accent6" hlink="hlink" folHlink="folHlink"/>
+  <p:notesStyle>
+    <a:lvl1pPr marL="0" algn="l" defTabSz="457200" rtl="0" eaLnBrk="1" latinLnBrk="0" hangingPunct="1">
+      <a:defRPr sz="1200" kern="1200">
+        <a:solidFill>
+          <a:schemeClr val="tx1"/>
+        </a:solidFill>
+        <a:latin typeface="+mn-lt"/>
+        <a:ea typeface="+mn-ea"/>
+        <a:cs typeface="+mn-cs"/>
+      </a:defRPr>
+    </a:lvl1pPr>
+    <a:lvl2pPr marL="457200" algn="l" defTabSz="457200" rtl="0" eaLnBrk="1" latinLnBrk="0" hangingPunct="1">
+      <a:defRPr sz="1200" kern="1200">
+        <a:solidFill>
+          <a:schemeClr val="tx1"/>
+        </a:solidFill>
+        <a:latin typeface="+mn-lt"/>
+        <a:ea typeface="+mn-ea"/>
+        <a:cs typeface="+mn-cs"/>
+      </a:defRPr>
+    </a:lvl2pPr>
+    <a:lvl3pPr marL="914400" algn="l" defTabSz="457200" rtl="0" eaLnBrk="1" latinLnBrk="0" hangingPunct="1">
+      <a:defRPr sz="1200" kern="1200">
+        <a:solidFill>
+          <a:schemeClr val="tx1"/>
+        </a:solidFill>
+        <a:latin typeface="+mn-lt"/>
+        <a:ea typeface="+mn-ea"/>
+        <a:cs typeface="+mn-cs"/>
+      </a:defRPr>
+    </a:lvl3pPr>
+    <a:lvl4pPr marL="1371600" algn="l" defTabSz="457200" rtl="0" eaLnBrk="1" latinLnBrk="0" hangingPunct="1">
+      <a:defRPr sz="1200" kern="1200">
+        <a:solidFill>
+          <a:schemeClr val="tx1"/>
+        </a:solidFill>
+        <a:latin typeface="+mn-lt"/>
+        <a:ea typeface="+mn-ea"/>
+        <a:cs typeface="+mn-cs"/>
+      </a:defRPr>
+    </a:lvl4pPr>
+    <a:lvl5pPr marL="1828800" algn="l" defTabSz="457200" rtl="0" eaLnBrk="1" latinLnBrk="0" hangingPunct="1">
+      <a:defRPr sz="1200" kern="1200">
+        <a:solidFill>
+          <a:schemeClr val="tx1"/>
+        </a:solidFill>
+        <a:latin typeface="+mn-lt"/>
+        <a:ea typeface="+mn-ea"/>
+        <a:cs typeface="+mn-cs"/>
+      </a:defRPr>
+    </a:lvl5pPr>
+    <a:lvl6pPr marL="2286000" algn="l" defTabSz="457200" rtl="0" eaLnBrk="1" latinLnBrk="0" hangingPunct="1">
+      <a:defRPr sz="1200" kern="1200">
+        <a:solidFill>
+          <a:schemeClr val="tx1"/>
+        </a:solidFill>
+        <a:latin typeface="+mn-lt"/>
+        <a:ea typeface="+mn-ea"/>
+        <a:cs typeface="+mn-cs"/>
+      </a:defRPr>
+    </a:lvl6pPr>
+    <a:lvl7pPr marL="2743200" algn="l" defTabSz="457200" rtl="0" eaLnBrk="1" latinLnBrk="0" hangingPunct="1">
+      <a:defRPr sz="1200" kern="1200">
+        <a:solidFill>
+          <a:schemeClr val="tx1"/>
+        </a:solidFill>
+        <a:latin typeface="+mn-lt"/>
+        <a:ea typeface="+mn-ea"/>
+        <a:cs typeface="+mn-cs"/>
+      </a:defRPr>
+    </a:lvl7pPr>
+    <a:lvl8pPr marL="3200400" algn="l" defTabSz="457200" rtl="0" eaLnBrk="1" latinLnBrk="0" hangingPunct="1">
+      <a:defRPr sz="1200" kern="1200">
+        <a:solidFill>
+          <a:schemeClr val="tx1"/>
+        </a:solidFill>
+        <a:latin typeface="+mn-lt"/>
+        <a:ea typeface="+mn-ea"/>
+        <a:cs typeface="+mn-cs"/>
+      </a:defRPr>
+    </a:lvl8pPr>
+    <a:lvl9pPr marL="3657600" algn="l" defTabSz="457200" rtl="0" eaLnBrk="1" latinLnBrk="0" hangingPunct="1">
+      <a:defRPr sz="1200" kern="1200">
+        <a:solidFill>
+          <a:schemeClr val="tx1"/>
+        </a:solidFill>
+        <a:latin typeface="+mn-lt"/>
+        <a:ea typeface="+mn-ea"/>
+        <a:cs typeface="+mn-cs"/>
+      </a:defRPr>
+    </a:lvl9pPr>
+  </p:notesStyle>
+</p:notesMaster>
 </file>
 
 <file path=ppt/slideLayouts/slideLayout1.xml><?xml version="1.0" encoding="utf-8"?>
@@ -3358,7 +3716,6 @@
               <a:rPr lang="en-US" dirty="0" smtClean="0"/>
               <a:t>Social gathering Sept. 15th @ 4pm in 6201 MSB</a:t>
             </a:r>
-            <a:endParaRPr lang="en-US" dirty="0" smtClean="0"/>
           </a:p>
           <a:p>
             <a:r>
@@ -3381,7 +3738,6 @@
               <a:rPr lang="en-US" dirty="0" smtClean="0"/>
               <a:t>Sign up for our listserv to get updates!</a:t>
             </a:r>
-            <a:endParaRPr lang="en-US" dirty="0" smtClean="0"/>
           </a:p>
           <a:p>
             <a:endParaRPr lang="en-US" dirty="0" smtClean="0"/>
@@ -3670,7 +4026,6 @@
               <a:rPr lang="en-US" dirty="0" smtClean="0"/>
               <a:t>Different format this semester</a:t>
             </a:r>
-            <a:endParaRPr lang="en-US" dirty="0" smtClean="0"/>
           </a:p>
         </p:txBody>
       </p:sp>
@@ -3684,6 +4039,1206 @@
   <p:clrMapOvr>
     <a:masterClrMapping/>
   </p:clrMapOvr>
+</p:sld>
+</file>
+
+<file path=ppt/slides/slide5.xml><?xml version="1.0" encoding="utf-8"?>
+<p:sld xmlns:a="http://schemas.openxmlformats.org/drawingml/2006/main" xmlns:r="http://schemas.openxmlformats.org/officeDocument/2006/relationships" xmlns:p="http://schemas.openxmlformats.org/presentationml/2006/main">
+  <p:cSld>
+    <p:spTree>
+      <p:nvGrpSpPr>
+        <p:cNvPr id="1" name=""/>
+        <p:cNvGrpSpPr/>
+        <p:nvPr/>
+      </p:nvGrpSpPr>
+      <p:grpSpPr>
+        <a:xfrm>
+          <a:off x="0" y="0"/>
+          <a:ext cx="0" cy="0"/>
+          <a:chOff x="0" y="0"/>
+          <a:chExt cx="0" cy="0"/>
+        </a:xfrm>
+      </p:grpSpPr>
+      <p:sp>
+        <p:nvSpPr>
+          <p:cNvPr id="2" name="Title 1"/>
+          <p:cNvSpPr>
+            <a:spLocks noGrp="1"/>
+          </p:cNvSpPr>
+          <p:nvPr>
+            <p:ph type="title"/>
+          </p:nvPr>
+        </p:nvSpPr>
+        <p:spPr/>
+        <p:txBody>
+          <a:bodyPr>
+            <a:normAutofit fontScale="90000"/>
+          </a:bodyPr>
+          <a:lstStyle/>
+          <a:p>
+            <a:r>
+              <a:rPr lang="en-US" dirty="0" smtClean="0"/>
+              <a:t>What are Software and Data Carpentry?</a:t>
+            </a:r>
+            <a:endParaRPr lang="en-US" dirty="0"/>
+          </a:p>
+        </p:txBody>
+      </p:sp>
+      <p:sp>
+        <p:nvSpPr>
+          <p:cNvPr id="5" name="Rounded Rectangle 4"/>
+          <p:cNvSpPr/>
+          <p:nvPr/>
+        </p:nvSpPr>
+        <p:spPr>
+          <a:xfrm>
+            <a:off x="334793" y="1611847"/>
+            <a:ext cx="2021490" cy="4264253"/>
+          </a:xfrm>
+          <a:prstGeom prst="roundRect">
+            <a:avLst/>
+          </a:prstGeom>
+          <a:solidFill>
+            <a:srgbClr val="242852"/>
+          </a:solidFill>
+          <a:ln>
+            <a:solidFill>
+              <a:schemeClr val="bg2"/>
+            </a:solidFill>
+          </a:ln>
+        </p:spPr>
+        <p:style>
+          <a:lnRef idx="3">
+            <a:schemeClr val="lt1"/>
+          </a:lnRef>
+          <a:fillRef idx="1">
+            <a:schemeClr val="accent4"/>
+          </a:fillRef>
+          <a:effectRef idx="1">
+            <a:schemeClr val="accent4"/>
+          </a:effectRef>
+          <a:fontRef idx="minor">
+            <a:schemeClr val="lt1"/>
+          </a:fontRef>
+        </p:style>
+        <p:txBody>
+          <a:bodyPr rtlCol="0" anchor="b" anchorCtr="0"/>
+          <a:lstStyle/>
+          <a:p>
+            <a:pPr algn="ctr"/>
+            <a:r>
+              <a:rPr lang="en-US" dirty="0" smtClean="0"/>
+              <a:t>Two formal </a:t>
+            </a:r>
+            <a:r>
+              <a:rPr lang="en-US" b="1" dirty="0" smtClean="0"/>
+              <a:t>organizations*</a:t>
+            </a:r>
+            <a:r>
+              <a:rPr lang="en-US" dirty="0" smtClean="0"/>
+              <a:t> + international </a:t>
+            </a:r>
+            <a:r>
+              <a:rPr lang="en-US" b="1" dirty="0" smtClean="0"/>
+              <a:t>community </a:t>
+            </a:r>
+            <a:r>
+              <a:rPr lang="en-US" dirty="0" smtClean="0"/>
+              <a:t>of volunteers</a:t>
+            </a:r>
+            <a:endParaRPr lang="en-US" dirty="0"/>
+          </a:p>
+        </p:txBody>
+      </p:sp>
+      <p:sp>
+        <p:nvSpPr>
+          <p:cNvPr id="6" name="Rounded Rectangle 5"/>
+          <p:cNvSpPr/>
+          <p:nvPr/>
+        </p:nvSpPr>
+        <p:spPr>
+          <a:xfrm>
+            <a:off x="2493990" y="1611847"/>
+            <a:ext cx="2034974" cy="4264253"/>
+          </a:xfrm>
+          <a:prstGeom prst="roundRect">
+            <a:avLst/>
+          </a:prstGeom>
+          <a:solidFill>
+            <a:srgbClr val="242852"/>
+          </a:solidFill>
+          <a:ln>
+            <a:solidFill>
+              <a:schemeClr val="bg2"/>
+            </a:solidFill>
+          </a:ln>
+        </p:spPr>
+        <p:style>
+          <a:lnRef idx="3">
+            <a:schemeClr val="lt1"/>
+          </a:lnRef>
+          <a:fillRef idx="1">
+            <a:schemeClr val="accent4"/>
+          </a:fillRef>
+          <a:effectRef idx="1">
+            <a:schemeClr val="accent4"/>
+          </a:effectRef>
+          <a:fontRef idx="minor">
+            <a:schemeClr val="lt1"/>
+          </a:fontRef>
+        </p:style>
+        <p:txBody>
+          <a:bodyPr rtlCol="0" anchor="b" anchorCtr="0"/>
+          <a:lstStyle/>
+          <a:p>
+            <a:pPr algn="ctr"/>
+            <a:r>
+              <a:rPr lang="en-US" dirty="0" smtClean="0"/>
+              <a:t>that develop </a:t>
+            </a:r>
+            <a:r>
+              <a:rPr lang="en-US" b="1" dirty="0" smtClean="0"/>
+              <a:t>lessons</a:t>
+            </a:r>
+            <a:r>
+              <a:rPr lang="en-US" dirty="0" smtClean="0"/>
+              <a:t>, train </a:t>
+            </a:r>
+            <a:r>
+              <a:rPr lang="en-US" b="1" dirty="0" smtClean="0"/>
+              <a:t>instructors</a:t>
+            </a:r>
+            <a:r>
+              <a:rPr lang="en-US" dirty="0" smtClean="0"/>
+              <a:t> + organize </a:t>
+            </a:r>
+            <a:r>
+              <a:rPr lang="en-US" b="1" dirty="0" smtClean="0"/>
+              <a:t>workshops</a:t>
+            </a:r>
+            <a:endParaRPr lang="en-US" b="1" dirty="0"/>
+          </a:p>
+        </p:txBody>
+      </p:sp>
+      <p:sp>
+        <p:nvSpPr>
+          <p:cNvPr id="7" name="Rounded Rectangle 6"/>
+          <p:cNvSpPr/>
+          <p:nvPr/>
+        </p:nvSpPr>
+        <p:spPr>
+          <a:xfrm>
+            <a:off x="4697270" y="1611847"/>
+            <a:ext cx="2020886" cy="4264253"/>
+          </a:xfrm>
+          <a:prstGeom prst="roundRect">
+            <a:avLst/>
+          </a:prstGeom>
+          <a:solidFill>
+            <a:srgbClr val="242852"/>
+          </a:solidFill>
+          <a:ln>
+            <a:solidFill>
+              <a:schemeClr val="bg2"/>
+            </a:solidFill>
+          </a:ln>
+        </p:spPr>
+        <p:style>
+          <a:lnRef idx="3">
+            <a:schemeClr val="lt1"/>
+          </a:lnRef>
+          <a:fillRef idx="1">
+            <a:schemeClr val="accent4"/>
+          </a:fillRef>
+          <a:effectRef idx="1">
+            <a:schemeClr val="accent4"/>
+          </a:effectRef>
+          <a:fontRef idx="minor">
+            <a:schemeClr val="lt1"/>
+          </a:fontRef>
+        </p:style>
+        <p:txBody>
+          <a:bodyPr rtlCol="0" anchor="b" anchorCtr="0"/>
+          <a:lstStyle/>
+          <a:p>
+            <a:pPr algn="ctr"/>
+            <a:r>
+              <a:rPr lang="en-US" dirty="0" smtClean="0"/>
+              <a:t>in </a:t>
+            </a:r>
+            <a:r>
+              <a:rPr lang="en-US" b="1" dirty="0" smtClean="0"/>
+              <a:t>data</a:t>
+            </a:r>
+            <a:r>
+              <a:rPr lang="en-US" dirty="0" smtClean="0"/>
+              <a:t> management and </a:t>
+            </a:r>
+            <a:r>
+              <a:rPr lang="en-US" b="1" dirty="0" smtClean="0"/>
+              <a:t>software </a:t>
+            </a:r>
+            <a:r>
+              <a:rPr lang="en-US" dirty="0" smtClean="0"/>
+              <a:t>development</a:t>
+            </a:r>
+          </a:p>
+          <a:p>
+            <a:pPr algn="ctr"/>
+            <a:r>
+              <a:rPr lang="en-US" b="1" dirty="0" smtClean="0"/>
+              <a:t>best practices</a:t>
+            </a:r>
+            <a:endParaRPr lang="en-US" b="1" dirty="0"/>
+          </a:p>
+        </p:txBody>
+      </p:sp>
+      <p:sp>
+        <p:nvSpPr>
+          <p:cNvPr id="8" name="Rounded Rectangle 7"/>
+          <p:cNvSpPr/>
+          <p:nvPr/>
+        </p:nvSpPr>
+        <p:spPr>
+          <a:xfrm>
+            <a:off x="6877697" y="1611847"/>
+            <a:ext cx="2011929" cy="4264253"/>
+          </a:xfrm>
+          <a:prstGeom prst="roundRect">
+            <a:avLst/>
+          </a:prstGeom>
+          <a:solidFill>
+            <a:srgbClr val="242852"/>
+          </a:solidFill>
+          <a:ln>
+            <a:solidFill>
+              <a:schemeClr val="bg2"/>
+            </a:solidFill>
+          </a:ln>
+        </p:spPr>
+        <p:style>
+          <a:lnRef idx="3">
+            <a:schemeClr val="lt1"/>
+          </a:lnRef>
+          <a:fillRef idx="1">
+            <a:schemeClr val="accent4"/>
+          </a:fillRef>
+          <a:effectRef idx="1">
+            <a:schemeClr val="accent4"/>
+          </a:effectRef>
+          <a:fontRef idx="minor">
+            <a:schemeClr val="lt1"/>
+          </a:fontRef>
+        </p:style>
+        <p:txBody>
+          <a:bodyPr rtlCol="0" anchor="b" anchorCtr="0"/>
+          <a:lstStyle/>
+          <a:p>
+            <a:pPr algn="ctr"/>
+            <a:r>
+              <a:rPr lang="en-US" dirty="0" smtClean="0"/>
+              <a:t>For and by </a:t>
+            </a:r>
+            <a:r>
+              <a:rPr lang="en-US" b="1" dirty="0" smtClean="0"/>
+              <a:t>researchers </a:t>
+            </a:r>
+            <a:r>
+              <a:rPr lang="en-US" dirty="0" smtClean="0"/>
+              <a:t>across disciplines</a:t>
+            </a:r>
+            <a:endParaRPr lang="en-US" dirty="0"/>
+          </a:p>
+        </p:txBody>
+      </p:sp>
+      <p:pic>
+        <p:nvPicPr>
+          <p:cNvPr id="11" name="Picture 10" descr="user-presentation-woman-whiteboard-512.png"/>
+          <p:cNvPicPr>
+            <a:picLocks noChangeAspect="1"/>
+          </p:cNvPicPr>
+          <p:nvPr/>
+        </p:nvPicPr>
+        <p:blipFill>
+          <a:blip r:embed="rId2">
+            <a:extLst>
+              <a:ext uri="{28A0092B-C50C-407E-A947-70E740481C1C}">
+                <a14:useLocalDpi xmlns:a14="http://schemas.microsoft.com/office/drawing/2010/main" val="0"/>
+              </a:ext>
+            </a:extLst>
+          </a:blip>
+          <a:stretch>
+            <a:fillRect/>
+          </a:stretch>
+        </p:blipFill>
+        <p:spPr>
+          <a:xfrm>
+            <a:off x="2894333" y="1979938"/>
+            <a:ext cx="1317141" cy="1756188"/>
+          </a:xfrm>
+          <a:prstGeom prst="rect">
+            <a:avLst/>
+          </a:prstGeom>
+        </p:spPr>
+      </p:pic>
+      <p:sp>
+        <p:nvSpPr>
+          <p:cNvPr id="13" name="TextBox 12"/>
+          <p:cNvSpPr txBox="1"/>
+          <p:nvPr/>
+        </p:nvSpPr>
+        <p:spPr>
+          <a:xfrm>
+            <a:off x="199041" y="6065113"/>
+            <a:ext cx="5364607" cy="215444"/>
+          </a:xfrm>
+          <a:prstGeom prst="rect">
+            <a:avLst/>
+          </a:prstGeom>
+          <a:noFill/>
+        </p:spPr>
+        <p:txBody>
+          <a:bodyPr wrap="square" rtlCol="0">
+            <a:spAutoFit/>
+          </a:bodyPr>
+          <a:lstStyle/>
+          <a:p>
+            <a:r>
+              <a:rPr lang="en-US" sz="800" dirty="0" smtClean="0"/>
+              <a:t>* soon to be restructured into a combined organization</a:t>
+            </a:r>
+            <a:endParaRPr lang="en-US" sz="800" dirty="0"/>
+          </a:p>
+        </p:txBody>
+      </p:sp>
+      <p:pic>
+        <p:nvPicPr>
+          <p:cNvPr id="14" name="Picture 13" descr="noun_707714_cc.png"/>
+          <p:cNvPicPr>
+            <a:picLocks noChangeAspect="1"/>
+          </p:cNvPicPr>
+          <p:nvPr/>
+        </p:nvPicPr>
+        <p:blipFill rotWithShape="1">
+          <a:blip r:embed="rId3">
+            <a:extLst>
+              <a:ext uri="{28A0092B-C50C-407E-A947-70E740481C1C}">
+                <a14:useLocalDpi xmlns:a14="http://schemas.microsoft.com/office/drawing/2010/main" val="0"/>
+              </a:ext>
+            </a:extLst>
+          </a:blip>
+          <a:srcRect b="14318"/>
+          <a:stretch/>
+        </p:blipFill>
+        <p:spPr>
+          <a:xfrm>
+            <a:off x="7099099" y="2855667"/>
+            <a:ext cx="842157" cy="962107"/>
+          </a:xfrm>
+          <a:prstGeom prst="rect">
+            <a:avLst/>
+          </a:prstGeom>
+        </p:spPr>
+      </p:pic>
+      <p:pic>
+        <p:nvPicPr>
+          <p:cNvPr id="15" name="Picture 14" descr="noun_971030_cc.png"/>
+          <p:cNvPicPr>
+            <a:picLocks noChangeAspect="1"/>
+          </p:cNvPicPr>
+          <p:nvPr/>
+        </p:nvPicPr>
+        <p:blipFill rotWithShape="1">
+          <a:blip r:embed="rId4">
+            <a:extLst>
+              <a:ext uri="{28A0092B-C50C-407E-A947-70E740481C1C}">
+                <a14:useLocalDpi xmlns:a14="http://schemas.microsoft.com/office/drawing/2010/main" val="0"/>
+              </a:ext>
+            </a:extLst>
+          </a:blip>
+          <a:srcRect b="15966"/>
+          <a:stretch/>
+        </p:blipFill>
+        <p:spPr>
+          <a:xfrm>
+            <a:off x="7355008" y="1694562"/>
+            <a:ext cx="1036287" cy="1161105"/>
+          </a:xfrm>
+          <a:prstGeom prst="rect">
+            <a:avLst/>
+          </a:prstGeom>
+        </p:spPr>
+      </p:pic>
+      <p:pic>
+        <p:nvPicPr>
+          <p:cNvPr id="16" name="Picture 15" descr="noun_979326_cc.png"/>
+          <p:cNvPicPr>
+            <a:picLocks noChangeAspect="1"/>
+          </p:cNvPicPr>
+          <p:nvPr/>
+        </p:nvPicPr>
+        <p:blipFill rotWithShape="1">
+          <a:blip r:embed="rId5">
+            <a:extLst>
+              <a:ext uri="{28A0092B-C50C-407E-A947-70E740481C1C}">
+                <a14:useLocalDpi xmlns:a14="http://schemas.microsoft.com/office/drawing/2010/main" val="0"/>
+              </a:ext>
+            </a:extLst>
+          </a:blip>
+          <a:srcRect b="14669"/>
+          <a:stretch/>
+        </p:blipFill>
+        <p:spPr>
+          <a:xfrm>
+            <a:off x="7831817" y="2880939"/>
+            <a:ext cx="966201" cy="1099292"/>
+          </a:xfrm>
+          <a:prstGeom prst="rect">
+            <a:avLst/>
+          </a:prstGeom>
+        </p:spPr>
+      </p:pic>
+      <p:pic>
+        <p:nvPicPr>
+          <p:cNvPr id="17" name="Picture 16" descr="noun_440108_cc.png"/>
+          <p:cNvPicPr>
+            <a:picLocks noChangeAspect="1"/>
+          </p:cNvPicPr>
+          <p:nvPr/>
+        </p:nvPicPr>
+        <p:blipFill rotWithShape="1">
+          <a:blip r:embed="rId6">
+            <a:extLst>
+              <a:ext uri="{28A0092B-C50C-407E-A947-70E740481C1C}">
+                <a14:useLocalDpi xmlns:a14="http://schemas.microsoft.com/office/drawing/2010/main" val="0"/>
+              </a:ext>
+            </a:extLst>
+          </a:blip>
+          <a:srcRect b="12851"/>
+          <a:stretch/>
+        </p:blipFill>
+        <p:spPr>
+          <a:xfrm>
+            <a:off x="4957049" y="2148071"/>
+            <a:ext cx="1043924" cy="1213023"/>
+          </a:xfrm>
+          <a:prstGeom prst="rect">
+            <a:avLst/>
+          </a:prstGeom>
+        </p:spPr>
+      </p:pic>
+      <p:pic>
+        <p:nvPicPr>
+          <p:cNvPr id="19" name="Picture 18" descr="noun_938987_cc.png"/>
+          <p:cNvPicPr>
+            <a:picLocks noChangeAspect="1"/>
+          </p:cNvPicPr>
+          <p:nvPr/>
+        </p:nvPicPr>
+        <p:blipFill rotWithShape="1">
+          <a:blip r:embed="rId7">
+            <a:extLst>
+              <a:ext uri="{28A0092B-C50C-407E-A947-70E740481C1C}">
+                <a14:useLocalDpi xmlns:a14="http://schemas.microsoft.com/office/drawing/2010/main" val="0"/>
+              </a:ext>
+            </a:extLst>
+          </a:blip>
+          <a:srcRect b="16799"/>
+          <a:stretch/>
+        </p:blipFill>
+        <p:spPr>
+          <a:xfrm>
+            <a:off x="5406019" y="2600733"/>
+            <a:ext cx="1023481" cy="1135393"/>
+          </a:xfrm>
+          <a:prstGeom prst="rect">
+            <a:avLst/>
+          </a:prstGeom>
+        </p:spPr>
+      </p:pic>
+      <p:pic>
+        <p:nvPicPr>
+          <p:cNvPr id="4" name="Picture 3" descr="logo-white-swc.png"/>
+          <p:cNvPicPr>
+            <a:picLocks noChangeAspect="1"/>
+          </p:cNvPicPr>
+          <p:nvPr/>
+        </p:nvPicPr>
+        <p:blipFill>
+          <a:blip r:embed="rId8">
+            <a:extLst>
+              <a:ext uri="{28A0092B-C50C-407E-A947-70E740481C1C}">
+                <a14:useLocalDpi xmlns:a14="http://schemas.microsoft.com/office/drawing/2010/main" val="0"/>
+              </a:ext>
+            </a:extLst>
+          </a:blip>
+          <a:stretch>
+            <a:fillRect/>
+          </a:stretch>
+        </p:blipFill>
+        <p:spPr>
+          <a:xfrm>
+            <a:off x="487586" y="1979938"/>
+            <a:ext cx="1663385" cy="453509"/>
+          </a:xfrm>
+          <a:prstGeom prst="rect">
+            <a:avLst/>
+          </a:prstGeom>
+        </p:spPr>
+      </p:pic>
+      <p:pic>
+        <p:nvPicPr>
+          <p:cNvPr id="10" name="Picture 9" descr="DC_square.png"/>
+          <p:cNvPicPr>
+            <a:picLocks noChangeAspect="1"/>
+          </p:cNvPicPr>
+          <p:nvPr/>
+        </p:nvPicPr>
+        <p:blipFill>
+          <a:blip r:embed="rId9">
+            <a:extLst>
+              <a:ext uri="{28A0092B-C50C-407E-A947-70E740481C1C}">
+                <a14:useLocalDpi xmlns:a14="http://schemas.microsoft.com/office/drawing/2010/main" val="0"/>
+              </a:ext>
+            </a:extLst>
+          </a:blip>
+          <a:stretch>
+            <a:fillRect/>
+          </a:stretch>
+        </p:blipFill>
+        <p:spPr>
+          <a:xfrm>
+            <a:off x="1192640" y="2248500"/>
+            <a:ext cx="958330" cy="1277773"/>
+          </a:xfrm>
+          <a:prstGeom prst="rect">
+            <a:avLst/>
+          </a:prstGeom>
+        </p:spPr>
+      </p:pic>
+      <p:pic>
+        <p:nvPicPr>
+          <p:cNvPr id="18" name="Picture 17" descr="noun_1085525_cc.png"/>
+          <p:cNvPicPr>
+            <a:picLocks noChangeAspect="1"/>
+          </p:cNvPicPr>
+          <p:nvPr/>
+        </p:nvPicPr>
+        <p:blipFill rotWithShape="1">
+          <a:blip r:embed="rId10">
+            <a:extLst>
+              <a:ext uri="{28A0092B-C50C-407E-A947-70E740481C1C}">
+                <a14:useLocalDpi xmlns:a14="http://schemas.microsoft.com/office/drawing/2010/main" val="0"/>
+              </a:ext>
+            </a:extLst>
+          </a:blip>
+          <a:srcRect b="22299"/>
+          <a:stretch/>
+        </p:blipFill>
+        <p:spPr>
+          <a:xfrm>
+            <a:off x="487585" y="2855668"/>
+            <a:ext cx="887736" cy="919705"/>
+          </a:xfrm>
+          <a:prstGeom prst="rect">
+            <a:avLst/>
+          </a:prstGeom>
+        </p:spPr>
+      </p:pic>
+      <p:sp>
+        <p:nvSpPr>
+          <p:cNvPr id="3" name="TextBox 2"/>
+          <p:cNvSpPr txBox="1"/>
+          <p:nvPr/>
+        </p:nvSpPr>
+        <p:spPr>
+          <a:xfrm>
+            <a:off x="334793" y="6402395"/>
+            <a:ext cx="2559540" cy="369332"/>
+          </a:xfrm>
+          <a:prstGeom prst="rect">
+            <a:avLst/>
+          </a:prstGeom>
+          <a:noFill/>
+        </p:spPr>
+        <p:txBody>
+          <a:bodyPr wrap="square" rtlCol="0">
+            <a:spAutoFit/>
+          </a:bodyPr>
+          <a:lstStyle/>
+          <a:p>
+            <a:r>
+              <a:rPr lang="en-US" dirty="0" smtClean="0"/>
+              <a:t>Slide from Christina Koch</a:t>
+            </a:r>
+            <a:endParaRPr lang="en-US" dirty="0"/>
+          </a:p>
+        </p:txBody>
+      </p:sp>
+    </p:spTree>
+    <p:extLst>
+      <p:ext uri="{BB962C8B-B14F-4D97-AF65-F5344CB8AC3E}">
+        <p14:creationId xmlns:p14="http://schemas.microsoft.com/office/powerpoint/2010/main" val="1994365553"/>
+      </p:ext>
+    </p:extLst>
+  </p:cSld>
+  <p:clrMapOvr>
+    <a:masterClrMapping/>
+  </p:clrMapOvr>
+  <p:timing>
+    <p:tnLst>
+      <p:par>
+        <p:cTn xmlns:p14="http://schemas.microsoft.com/office/powerpoint/2010/main" id="1" dur="indefinite" restart="never" nodeType="tmRoot"/>
+      </p:par>
+    </p:tnLst>
+  </p:timing>
+</p:sld>
+</file>
+
+<file path=ppt/slides/slide6.xml><?xml version="1.0" encoding="utf-8"?>
+<p:sld xmlns:a="http://schemas.openxmlformats.org/drawingml/2006/main" xmlns:r="http://schemas.openxmlformats.org/officeDocument/2006/relationships" xmlns:p="http://schemas.openxmlformats.org/presentationml/2006/main">
+  <p:cSld>
+    <p:spTree>
+      <p:nvGrpSpPr>
+        <p:cNvPr id="1" name=""/>
+        <p:cNvGrpSpPr/>
+        <p:nvPr/>
+      </p:nvGrpSpPr>
+      <p:grpSpPr>
+        <a:xfrm>
+          <a:off x="0" y="0"/>
+          <a:ext cx="0" cy="0"/>
+          <a:chOff x="0" y="0"/>
+          <a:chExt cx="0" cy="0"/>
+        </a:xfrm>
+      </p:grpSpPr>
+      <p:sp>
+        <p:nvSpPr>
+          <p:cNvPr id="2" name="Title 1"/>
+          <p:cNvSpPr>
+            <a:spLocks noGrp="1"/>
+          </p:cNvSpPr>
+          <p:nvPr>
+            <p:ph type="title"/>
+          </p:nvPr>
+        </p:nvSpPr>
+        <p:spPr/>
+        <p:txBody>
+          <a:bodyPr/>
+          <a:lstStyle/>
+          <a:p>
+            <a:r>
+              <a:rPr lang="en-US" dirty="0" smtClean="0"/>
+              <a:t>Software/Data Carpentry</a:t>
+            </a:r>
+            <a:endParaRPr lang="en-US" dirty="0"/>
+          </a:p>
+        </p:txBody>
+      </p:sp>
+      <p:sp>
+        <p:nvSpPr>
+          <p:cNvPr id="3" name="Content Placeholder 2"/>
+          <p:cNvSpPr>
+            <a:spLocks noGrp="1"/>
+          </p:cNvSpPr>
+          <p:nvPr>
+            <p:ph idx="1"/>
+          </p:nvPr>
+        </p:nvSpPr>
+        <p:spPr/>
+        <p:txBody>
+          <a:bodyPr>
+            <a:normAutofit fontScale="92500" lnSpcReduction="20000"/>
+          </a:bodyPr>
+          <a:lstStyle/>
+          <a:p>
+            <a:r>
+              <a:rPr lang="en-US" dirty="0" smtClean="0"/>
+              <a:t>2 workshops hosted at beginning of each semester</a:t>
+            </a:r>
+          </a:p>
+          <a:p>
+            <a:pPr lvl="1"/>
+            <a:r>
+              <a:rPr lang="en-US" dirty="0" smtClean="0"/>
+              <a:t>Next workshops probably January 2018</a:t>
+            </a:r>
+          </a:p>
+          <a:p>
+            <a:r>
+              <a:rPr lang="en-US" dirty="0" smtClean="0"/>
+              <a:t>Large local community of instructors</a:t>
+            </a:r>
+          </a:p>
+          <a:p>
+            <a:r>
+              <a:rPr lang="en-US" dirty="0" smtClean="0"/>
+              <a:t>If interested you can help out or instruct these workshops</a:t>
+            </a:r>
+          </a:p>
+          <a:p>
+            <a:pPr lvl="1"/>
+            <a:r>
+              <a:rPr lang="en-US" dirty="0" smtClean="0"/>
+              <a:t>Professional Development/Teaching opportunity</a:t>
+            </a:r>
+          </a:p>
+          <a:p>
+            <a:r>
+              <a:rPr lang="en-US" dirty="0" smtClean="0"/>
+              <a:t>For updates about registration (and other computational events on campus) sign up for ACI (advanced computing initiative) listserv </a:t>
+            </a:r>
+          </a:p>
+          <a:p>
+            <a:pPr lvl="1"/>
+            <a:r>
+              <a:rPr lang="en-US" dirty="0" err="1"/>
+              <a:t>aci.wisc.edu</a:t>
+            </a:r>
+            <a:endParaRPr lang="en-US" dirty="0"/>
+          </a:p>
+        </p:txBody>
+      </p:sp>
+    </p:spTree>
+    <p:extLst>
+      <p:ext uri="{BB962C8B-B14F-4D97-AF65-F5344CB8AC3E}">
+        <p14:creationId xmlns:p14="http://schemas.microsoft.com/office/powerpoint/2010/main" val="1549699350"/>
+      </p:ext>
+    </p:extLst>
+  </p:cSld>
+  <p:clrMapOvr>
+    <a:masterClrMapping/>
+  </p:clrMapOvr>
+</p:sld>
+</file>
+
+<file path=ppt/slides/slide7.xml><?xml version="1.0" encoding="utf-8"?>
+<p:sld xmlns:a="http://schemas.openxmlformats.org/drawingml/2006/main" xmlns:r="http://schemas.openxmlformats.org/officeDocument/2006/relationships" xmlns:p="http://schemas.openxmlformats.org/presentationml/2006/main">
+  <p:cSld>
+    <p:spTree>
+      <p:nvGrpSpPr>
+        <p:cNvPr id="1" name=""/>
+        <p:cNvGrpSpPr/>
+        <p:nvPr/>
+      </p:nvGrpSpPr>
+      <p:grpSpPr>
+        <a:xfrm>
+          <a:off x="0" y="0"/>
+          <a:ext cx="0" cy="0"/>
+          <a:chOff x="0" y="0"/>
+          <a:chExt cx="0" cy="0"/>
+        </a:xfrm>
+      </p:grpSpPr>
+      <p:sp>
+        <p:nvSpPr>
+          <p:cNvPr id="2" name="Title 1"/>
+          <p:cNvSpPr>
+            <a:spLocks noGrp="1"/>
+          </p:cNvSpPr>
+          <p:nvPr>
+            <p:ph type="title"/>
+          </p:nvPr>
+        </p:nvSpPr>
+        <p:spPr/>
+        <p:txBody>
+          <a:bodyPr>
+            <a:normAutofit fontScale="90000"/>
+          </a:bodyPr>
+          <a:lstStyle/>
+          <a:p>
+            <a:r>
+              <a:rPr lang="en-US" dirty="0" smtClean="0"/>
+              <a:t>Center for High Through-put Computing (CHTC)</a:t>
+            </a:r>
+            <a:endParaRPr lang="en-US" dirty="0"/>
+          </a:p>
+        </p:txBody>
+      </p:sp>
+      <p:sp>
+        <p:nvSpPr>
+          <p:cNvPr id="3" name="Content Placeholder 2"/>
+          <p:cNvSpPr>
+            <a:spLocks noGrp="1"/>
+          </p:cNvSpPr>
+          <p:nvPr>
+            <p:ph idx="1"/>
+          </p:nvPr>
+        </p:nvSpPr>
+        <p:spPr>
+          <a:xfrm>
+            <a:off x="457200" y="1600200"/>
+            <a:ext cx="3935399" cy="4525963"/>
+          </a:xfrm>
+        </p:spPr>
+        <p:txBody>
+          <a:bodyPr>
+            <a:normAutofit lnSpcReduction="10000"/>
+          </a:bodyPr>
+          <a:lstStyle/>
+          <a:p>
+            <a:r>
+              <a:rPr lang="en-US" dirty="0" smtClean="0"/>
+              <a:t>Campus resource</a:t>
+            </a:r>
+          </a:p>
+          <a:p>
+            <a:r>
+              <a:rPr lang="en-US" dirty="0" smtClean="0"/>
+              <a:t>Scale up your computational work</a:t>
+            </a:r>
+          </a:p>
+          <a:p>
+            <a:r>
+              <a:rPr lang="en-US" dirty="0" smtClean="0"/>
+              <a:t>Can run more analyses (and bigger jobs) using their resources</a:t>
+            </a:r>
+          </a:p>
+          <a:p>
+            <a:r>
+              <a:rPr lang="en-US" dirty="0" smtClean="0"/>
+              <a:t>Facilitators who can help you get started</a:t>
+            </a:r>
+          </a:p>
+          <a:p>
+            <a:endParaRPr lang="en-US" dirty="0" smtClean="0"/>
+          </a:p>
+        </p:txBody>
+      </p:sp>
+      <p:pic>
+        <p:nvPicPr>
+          <p:cNvPr id="4" name="Picture 3"/>
+          <p:cNvPicPr>
+            <a:picLocks noChangeAspect="1"/>
+          </p:cNvPicPr>
+          <p:nvPr/>
+        </p:nvPicPr>
+        <p:blipFill>
+          <a:blip r:embed="rId2"/>
+          <a:stretch>
+            <a:fillRect/>
+          </a:stretch>
+        </p:blipFill>
+        <p:spPr>
+          <a:xfrm>
+            <a:off x="4482806" y="1909492"/>
+            <a:ext cx="4565514" cy="3915840"/>
+          </a:xfrm>
+          <a:prstGeom prst="rect">
+            <a:avLst/>
+          </a:prstGeom>
+        </p:spPr>
+      </p:pic>
+    </p:spTree>
+    <p:extLst>
+      <p:ext uri="{BB962C8B-B14F-4D97-AF65-F5344CB8AC3E}">
+        <p14:creationId xmlns:p14="http://schemas.microsoft.com/office/powerpoint/2010/main" val="2827781871"/>
+      </p:ext>
+    </p:extLst>
+  </p:cSld>
+  <p:clrMapOvr>
+    <a:masterClrMapping/>
+  </p:clrMapOvr>
+</p:sld>
+</file>
+
+<file path=ppt/slides/slide8.xml><?xml version="1.0" encoding="utf-8"?>
+<p:sld xmlns:a="http://schemas.openxmlformats.org/drawingml/2006/main" xmlns:r="http://schemas.openxmlformats.org/officeDocument/2006/relationships" xmlns:p="http://schemas.openxmlformats.org/presentationml/2006/main">
+  <p:cSld>
+    <p:spTree>
+      <p:nvGrpSpPr>
+        <p:cNvPr id="1" name=""/>
+        <p:cNvGrpSpPr/>
+        <p:nvPr/>
+      </p:nvGrpSpPr>
+      <p:grpSpPr>
+        <a:xfrm>
+          <a:off x="0" y="0"/>
+          <a:ext cx="0" cy="0"/>
+          <a:chOff x="0" y="0"/>
+          <a:chExt cx="0" cy="0"/>
+        </a:xfrm>
+      </p:grpSpPr>
+      <p:sp>
+        <p:nvSpPr>
+          <p:cNvPr id="2" name="Title 1"/>
+          <p:cNvSpPr>
+            <a:spLocks noGrp="1"/>
+          </p:cNvSpPr>
+          <p:nvPr>
+            <p:ph type="title"/>
+          </p:nvPr>
+        </p:nvSpPr>
+        <p:spPr/>
+        <p:txBody>
+          <a:bodyPr/>
+          <a:lstStyle/>
+          <a:p>
+            <a:r>
+              <a:rPr lang="en-US" dirty="0" smtClean="0"/>
+              <a:t>Quantitate Biology Initiative</a:t>
+            </a:r>
+            <a:endParaRPr lang="en-US" dirty="0"/>
+          </a:p>
+        </p:txBody>
+      </p:sp>
+      <p:sp>
+        <p:nvSpPr>
+          <p:cNvPr id="3" name="Content Placeholder 2"/>
+          <p:cNvSpPr>
+            <a:spLocks noGrp="1"/>
+          </p:cNvSpPr>
+          <p:nvPr>
+            <p:ph idx="1"/>
+          </p:nvPr>
+        </p:nvSpPr>
+        <p:spPr/>
+        <p:txBody>
+          <a:bodyPr>
+            <a:normAutofit/>
+          </a:bodyPr>
+          <a:lstStyle/>
+          <a:p>
+            <a:r>
+              <a:rPr lang="en-US" dirty="0" smtClean="0"/>
+              <a:t>Initiative to bring together quantities biology on campus</a:t>
+            </a:r>
+          </a:p>
+          <a:p>
+            <a:pPr lvl="1"/>
+            <a:r>
+              <a:rPr lang="en-US" dirty="0" smtClean="0">
+                <a:hlinkClick r:id="rId2"/>
+              </a:rPr>
+              <a:t>https</a:t>
+            </a:r>
+            <a:r>
+              <a:rPr lang="en-US" dirty="0">
+                <a:hlinkClick r:id="rId2"/>
+              </a:rPr>
+              <a:t>://qbi.wisc.edu</a:t>
+            </a:r>
+            <a:r>
+              <a:rPr lang="en-US" dirty="0" smtClean="0">
+                <a:hlinkClick r:id="rId2"/>
+              </a:rPr>
+              <a:t>/</a:t>
+            </a:r>
+            <a:endParaRPr lang="en-US" dirty="0" smtClean="0"/>
+          </a:p>
+          <a:p>
+            <a:r>
+              <a:rPr lang="en-US" dirty="0" smtClean="0"/>
+              <a:t>New minor available!</a:t>
+            </a:r>
+          </a:p>
+          <a:p>
+            <a:pPr lvl="1"/>
+            <a:r>
+              <a:rPr lang="en-US" dirty="0"/>
+              <a:t>https://</a:t>
+            </a:r>
+            <a:r>
+              <a:rPr lang="en-US" dirty="0" err="1"/>
+              <a:t>qbi.wisc.edu</a:t>
+            </a:r>
+            <a:r>
+              <a:rPr lang="en-US" dirty="0"/>
+              <a:t>/education/</a:t>
+            </a:r>
+            <a:r>
+              <a:rPr lang="en-US" dirty="0" err="1"/>
+              <a:t>phd</a:t>
+            </a:r>
+            <a:r>
+              <a:rPr lang="en-US" dirty="0"/>
+              <a:t>-minor/</a:t>
+            </a:r>
+            <a:endParaRPr lang="en-US" dirty="0" smtClean="0"/>
+          </a:p>
+          <a:p>
+            <a:r>
+              <a:rPr lang="en-US" dirty="0" smtClean="0"/>
+              <a:t>Weekly Seminar Series</a:t>
+            </a:r>
+          </a:p>
+          <a:p>
+            <a:pPr lvl="1"/>
+            <a:r>
+              <a:rPr lang="en-US" dirty="0"/>
+              <a:t>https://wid.wisc.edu/seminars/qbio</a:t>
+            </a:r>
+            <a:r>
+              <a:rPr lang="en-US" dirty="0" smtClean="0"/>
+              <a:t>/</a:t>
+            </a:r>
+          </a:p>
+        </p:txBody>
+      </p:sp>
+    </p:spTree>
+    <p:extLst>
+      <p:ext uri="{BB962C8B-B14F-4D97-AF65-F5344CB8AC3E}">
+        <p14:creationId xmlns:p14="http://schemas.microsoft.com/office/powerpoint/2010/main" val="1395127207"/>
+      </p:ext>
+    </p:extLst>
+  </p:cSld>
+  <p:clrMapOvr>
+    <a:masterClrMapping/>
+  </p:clrMapOvr>
+  <p:timing>
+    <p:tnLst>
+      <p:par>
+        <p:cTn xmlns:p14="http://schemas.microsoft.com/office/powerpoint/2010/main" id="1" dur="indefinite" restart="never" nodeType="tmRoot"/>
+      </p:par>
+    </p:tnLst>
+  </p:timing>
+</p:sld>
+</file>
+
+<file path=ppt/slides/slide9.xml><?xml version="1.0" encoding="utf-8"?>
+<p:sld xmlns:a="http://schemas.openxmlformats.org/drawingml/2006/main" xmlns:r="http://schemas.openxmlformats.org/officeDocument/2006/relationships" xmlns:p="http://schemas.openxmlformats.org/presentationml/2006/main">
+  <p:cSld>
+    <p:spTree>
+      <p:nvGrpSpPr>
+        <p:cNvPr id="1" name=""/>
+        <p:cNvGrpSpPr/>
+        <p:nvPr/>
+      </p:nvGrpSpPr>
+      <p:grpSpPr>
+        <a:xfrm>
+          <a:off x="0" y="0"/>
+          <a:ext cx="0" cy="0"/>
+          <a:chOff x="0" y="0"/>
+          <a:chExt cx="0" cy="0"/>
+        </a:xfrm>
+      </p:grpSpPr>
+      <p:sp>
+        <p:nvSpPr>
+          <p:cNvPr id="2" name="Title 1"/>
+          <p:cNvSpPr>
+            <a:spLocks noGrp="1"/>
+          </p:cNvSpPr>
+          <p:nvPr>
+            <p:ph type="title"/>
+          </p:nvPr>
+        </p:nvSpPr>
+        <p:spPr/>
+        <p:txBody>
+          <a:bodyPr/>
+          <a:lstStyle/>
+          <a:p>
+            <a:r>
+              <a:rPr lang="en-US" dirty="0" smtClean="0"/>
+              <a:t>Other courses</a:t>
+            </a:r>
+            <a:endParaRPr lang="en-US" dirty="0"/>
+          </a:p>
+        </p:txBody>
+      </p:sp>
+      <p:sp>
+        <p:nvSpPr>
+          <p:cNvPr id="3" name="Content Placeholder 2"/>
+          <p:cNvSpPr>
+            <a:spLocks noGrp="1"/>
+          </p:cNvSpPr>
+          <p:nvPr>
+            <p:ph idx="1"/>
+          </p:nvPr>
+        </p:nvSpPr>
+        <p:spPr/>
+        <p:txBody>
+          <a:bodyPr/>
+          <a:lstStyle/>
+          <a:p>
+            <a:r>
+              <a:rPr lang="is-IS" dirty="0" smtClean="0"/>
+              <a:t>MICROBIO 875: Bioinformatics for Microbiologists (Might change numbers for Spring 2018)</a:t>
+            </a:r>
+          </a:p>
+          <a:p>
+            <a:r>
+              <a:rPr lang="en-US" dirty="0"/>
+              <a:t>BMI </a:t>
+            </a:r>
+            <a:r>
+              <a:rPr lang="en-US" dirty="0" smtClean="0"/>
+              <a:t>541 -  </a:t>
+            </a:r>
+            <a:r>
+              <a:rPr lang="en-US" dirty="0"/>
+              <a:t>Introduction to biostatistics</a:t>
+            </a:r>
+            <a:endParaRPr lang="is-IS" dirty="0" smtClean="0"/>
+          </a:p>
+          <a:p>
+            <a:r>
+              <a:rPr lang="en-US" dirty="0"/>
+              <a:t>BMI </a:t>
+            </a:r>
+            <a:r>
+              <a:rPr lang="en-US" dirty="0" smtClean="0"/>
+              <a:t>576</a:t>
+            </a:r>
+            <a:r>
+              <a:rPr lang="en-US" dirty="0"/>
+              <a:t> </a:t>
+            </a:r>
+            <a:r>
+              <a:rPr lang="en-US" dirty="0" smtClean="0"/>
+              <a:t>-  </a:t>
+            </a:r>
+            <a:r>
+              <a:rPr lang="en-US" dirty="0"/>
+              <a:t>Introduction to </a:t>
+            </a:r>
+            <a:r>
+              <a:rPr lang="en-US" dirty="0" smtClean="0"/>
+              <a:t>bioinformatics</a:t>
+            </a:r>
+          </a:p>
+          <a:p>
+            <a:r>
+              <a:rPr lang="en-US" dirty="0"/>
+              <a:t>BMI </a:t>
+            </a:r>
+            <a:r>
+              <a:rPr lang="en-US" dirty="0" smtClean="0"/>
+              <a:t>776 -  </a:t>
+            </a:r>
+            <a:r>
+              <a:rPr lang="en-US" dirty="0"/>
+              <a:t>Advanced bioinformatics</a:t>
+            </a:r>
+            <a:endParaRPr lang="is-IS" dirty="0" smtClean="0"/>
+          </a:p>
+          <a:p>
+            <a:r>
+              <a:rPr lang="is-IS" dirty="0" smtClean="0"/>
+              <a:t>CS301 - </a:t>
+            </a:r>
+            <a:r>
+              <a:rPr lang="en-US" dirty="0"/>
+              <a:t>Introduction to Data Programming</a:t>
+            </a:r>
+          </a:p>
+        </p:txBody>
+      </p:sp>
+    </p:spTree>
+    <p:extLst>
+      <p:ext uri="{BB962C8B-B14F-4D97-AF65-F5344CB8AC3E}">
+        <p14:creationId xmlns:p14="http://schemas.microsoft.com/office/powerpoint/2010/main" val="1623443689"/>
+      </p:ext>
+    </p:extLst>
+  </p:cSld>
+  <p:clrMapOvr>
+    <a:masterClrMapping/>
+  </p:clrMapOvr>
+  <p:timing>
+    <p:tnLst>
+      <p:par>
+        <p:cTn xmlns:p14="http://schemas.microsoft.com/office/powerpoint/2010/main" id="1" dur="indefinite" restart="never" nodeType="tmRoot"/>
+      </p:par>
+    </p:tnLst>
+  </p:timing>
 </p:sld>
 </file>
 
@@ -4005,4 +5560,324 @@
   </a:objectDefaults>
   <a:extraClrSchemeLst/>
 </a:theme>
+</file>
+
+<file path=ppt/theme/theme2.xml><?xml version="1.0" encoding="utf-8"?>
+<a:theme xmlns:a="http://schemas.openxmlformats.org/drawingml/2006/main" name="Office Theme">
+  <a:themeElements>
+    <a:clrScheme name="Office">
+      <a:dk1>
+        <a:sysClr val="windowText" lastClr="000000"/>
+      </a:dk1>
+      <a:lt1>
+        <a:sysClr val="window" lastClr="FFFFFF"/>
+      </a:lt1>
+      <a:dk2>
+        <a:srgbClr val="1F497D"/>
+      </a:dk2>
+      <a:lt2>
+        <a:srgbClr val="EEECE1"/>
+      </a:lt2>
+      <a:accent1>
+        <a:srgbClr val="4F81BD"/>
+      </a:accent1>
+      <a:accent2>
+        <a:srgbClr val="C0504D"/>
+      </a:accent2>
+      <a:accent3>
+        <a:srgbClr val="9BBB59"/>
+      </a:accent3>
+      <a:accent4>
+        <a:srgbClr val="8064A2"/>
+      </a:accent4>
+      <a:accent5>
+        <a:srgbClr val="4BACC6"/>
+      </a:accent5>
+      <a:accent6>
+        <a:srgbClr val="F79646"/>
+      </a:accent6>
+      <a:hlink>
+        <a:srgbClr val="0000FF"/>
+      </a:hlink>
+      <a:folHlink>
+        <a:srgbClr val="800080"/>
+      </a:folHlink>
+    </a:clrScheme>
+    <a:fontScheme name="Office">
+      <a:majorFont>
+        <a:latin typeface="Calibri"/>
+        <a:ea typeface=""/>
+        <a:cs typeface=""/>
+        <a:font script="Jpan" typeface="ＭＳ Ｐゴシック"/>
+        <a:font script="Hang" typeface="맑은 고딕"/>
+        <a:font script="Hans" typeface="宋体"/>
+        <a:font script="Hant" typeface="新細明體"/>
+        <a:font script="Arab" typeface="Times New Roman"/>
+        <a:font script="Hebr" typeface="Times New Roman"/>
+        <a:font script="Thai" typeface="Angsana New"/>
+        <a:font script="Ethi" typeface="Nyala"/>
+        <a:font script="Beng" typeface="Vrinda"/>
+        <a:font script="Gujr" typeface="Shruti"/>
+        <a:font script="Khmr" typeface="MoolBoran"/>
+        <a:font script="Knda" typeface="Tunga"/>
+        <a:font script="Guru" typeface="Raavi"/>
+        <a:font script="Cans" typeface="Euphemia"/>
+        <a:font script="Cher" typeface="Plantagenet Cherokee"/>
+        <a:font script="Yiii" typeface="Microsoft Yi Baiti"/>
+        <a:font script="Tibt" typeface="Microsoft Himalaya"/>
+        <a:font script="Thaa" typeface="MV Boli"/>
+        <a:font script="Deva" typeface="Mangal"/>
+        <a:font script="Telu" typeface="Gautami"/>
+        <a:font script="Taml" typeface="Latha"/>
+        <a:font script="Syrc" typeface="Estrangelo Edessa"/>
+        <a:font script="Orya" typeface="Kalinga"/>
+        <a:font script="Mlym" typeface="Kartika"/>
+        <a:font script="Laoo" typeface="DokChampa"/>
+        <a:font script="Sinh" typeface="Iskoola Pota"/>
+        <a:font script="Mong" typeface="Mongolian Baiti"/>
+        <a:font script="Viet" typeface="Times New Roman"/>
+        <a:font script="Uigh" typeface="Microsoft Uighur"/>
+        <a:font script="Geor" typeface="Sylfaen"/>
+      </a:majorFont>
+      <a:minorFont>
+        <a:latin typeface="Calibri"/>
+        <a:ea typeface=""/>
+        <a:cs typeface=""/>
+        <a:font script="Jpan" typeface="ＭＳ Ｐゴシック"/>
+        <a:font script="Hang" typeface="맑은 고딕"/>
+        <a:font script="Hans" typeface="宋体"/>
+        <a:font script="Hant" typeface="新細明體"/>
+        <a:font script="Arab" typeface="Arial"/>
+        <a:font script="Hebr" typeface="Arial"/>
+        <a:font script="Thai" typeface="Cordia New"/>
+        <a:font script="Ethi" typeface="Nyala"/>
+        <a:font script="Beng" typeface="Vrinda"/>
+        <a:font script="Gujr" typeface="Shruti"/>
+        <a:font script="Khmr" typeface="DaunPenh"/>
+        <a:font script="Knda" typeface="Tunga"/>
+        <a:font script="Guru" typeface="Raavi"/>
+        <a:font script="Cans" typeface="Euphemia"/>
+        <a:font script="Cher" typeface="Plantagenet Cherokee"/>
+        <a:font script="Yiii" typeface="Microsoft Yi Baiti"/>
+        <a:font script="Tibt" typeface="Microsoft Himalaya"/>
+        <a:font script="Thaa" typeface="MV Boli"/>
+        <a:font script="Deva" typeface="Mangal"/>
+        <a:font script="Telu" typeface="Gautami"/>
+        <a:font script="Taml" typeface="Latha"/>
+        <a:font script="Syrc" typeface="Estrangelo Edessa"/>
+        <a:font script="Orya" typeface="Kalinga"/>
+        <a:font script="Mlym" typeface="Kartika"/>
+        <a:font script="Laoo" typeface="DokChampa"/>
+        <a:font script="Sinh" typeface="Iskoola Pota"/>
+        <a:font script="Mong" typeface="Mongolian Baiti"/>
+        <a:font script="Viet" typeface="Arial"/>
+        <a:font script="Uigh" typeface="Microsoft Uighur"/>
+        <a:font script="Geor" typeface="Sylfaen"/>
+      </a:minorFont>
+    </a:fontScheme>
+    <a:fmtScheme name="Office">
+      <a:fillStyleLst>
+        <a:solidFill>
+          <a:schemeClr val="phClr"/>
+        </a:solidFill>
+        <a:gradFill rotWithShape="1">
+          <a:gsLst>
+            <a:gs pos="0">
+              <a:schemeClr val="phClr">
+                <a:tint val="50000"/>
+                <a:satMod val="300000"/>
+              </a:schemeClr>
+            </a:gs>
+            <a:gs pos="35000">
+              <a:schemeClr val="phClr">
+                <a:tint val="37000"/>
+                <a:satMod val="300000"/>
+              </a:schemeClr>
+            </a:gs>
+            <a:gs pos="100000">
+              <a:schemeClr val="phClr">
+                <a:tint val="15000"/>
+                <a:satMod val="350000"/>
+              </a:schemeClr>
+            </a:gs>
+          </a:gsLst>
+          <a:lin ang="16200000" scaled="1"/>
+        </a:gradFill>
+        <a:gradFill rotWithShape="1">
+          <a:gsLst>
+            <a:gs pos="0">
+              <a:schemeClr val="phClr">
+                <a:tint val="100000"/>
+                <a:shade val="100000"/>
+                <a:satMod val="130000"/>
+              </a:schemeClr>
+            </a:gs>
+            <a:gs pos="100000">
+              <a:schemeClr val="phClr">
+                <a:tint val="50000"/>
+                <a:shade val="100000"/>
+                <a:satMod val="350000"/>
+              </a:schemeClr>
+            </a:gs>
+          </a:gsLst>
+          <a:lin ang="16200000" scaled="0"/>
+        </a:gradFill>
+      </a:fillStyleLst>
+      <a:lnStyleLst>
+        <a:ln w="9525" cap="flat" cmpd="sng" algn="ctr">
+          <a:solidFill>
+            <a:schemeClr val="phClr">
+              <a:shade val="95000"/>
+              <a:satMod val="105000"/>
+            </a:schemeClr>
+          </a:solidFill>
+          <a:prstDash val="solid"/>
+        </a:ln>
+        <a:ln w="25400" cap="flat" cmpd="sng" algn="ctr">
+          <a:solidFill>
+            <a:schemeClr val="phClr"/>
+          </a:solidFill>
+          <a:prstDash val="solid"/>
+        </a:ln>
+        <a:ln w="38100" cap="flat" cmpd="sng" algn="ctr">
+          <a:solidFill>
+            <a:schemeClr val="phClr"/>
+          </a:solidFill>
+          <a:prstDash val="solid"/>
+        </a:ln>
+      </a:lnStyleLst>
+      <a:effectStyleLst>
+        <a:effectStyle>
+          <a:effectLst>
+            <a:outerShdw blurRad="40000" dist="20000" dir="5400000" rotWithShape="0">
+              <a:srgbClr val="000000">
+                <a:alpha val="38000"/>
+              </a:srgbClr>
+            </a:outerShdw>
+          </a:effectLst>
+        </a:effectStyle>
+        <a:effectStyle>
+          <a:effectLst>
+            <a:outerShdw blurRad="40000" dist="23000" dir="5400000" rotWithShape="0">
+              <a:srgbClr val="000000">
+                <a:alpha val="35000"/>
+              </a:srgbClr>
+            </a:outerShdw>
+          </a:effectLst>
+        </a:effectStyle>
+        <a:effectStyle>
+          <a:effectLst>
+            <a:outerShdw blurRad="40000" dist="23000" dir="5400000" rotWithShape="0">
+              <a:srgbClr val="000000">
+                <a:alpha val="35000"/>
+              </a:srgbClr>
+            </a:outerShdw>
+          </a:effectLst>
+          <a:scene3d>
+            <a:camera prst="orthographicFront">
+              <a:rot lat="0" lon="0" rev="0"/>
+            </a:camera>
+            <a:lightRig rig="threePt" dir="t">
+              <a:rot lat="0" lon="0" rev="1200000"/>
+            </a:lightRig>
+          </a:scene3d>
+          <a:sp3d>
+            <a:bevelT w="63500" h="25400"/>
+          </a:sp3d>
+        </a:effectStyle>
+      </a:effectStyleLst>
+      <a:bgFillStyleLst>
+        <a:solidFill>
+          <a:schemeClr val="phClr"/>
+        </a:solidFill>
+        <a:gradFill rotWithShape="1">
+          <a:gsLst>
+            <a:gs pos="0">
+              <a:schemeClr val="phClr">
+                <a:tint val="40000"/>
+                <a:satMod val="350000"/>
+              </a:schemeClr>
+            </a:gs>
+            <a:gs pos="40000">
+              <a:schemeClr val="phClr">
+                <a:tint val="45000"/>
+                <a:shade val="99000"/>
+                <a:satMod val="350000"/>
+              </a:schemeClr>
+            </a:gs>
+            <a:gs pos="100000">
+              <a:schemeClr val="phClr">
+                <a:shade val="20000"/>
+                <a:satMod val="255000"/>
+              </a:schemeClr>
+            </a:gs>
+          </a:gsLst>
+          <a:path path="circle">
+            <a:fillToRect l="50000" t="-80000" r="50000" b="180000"/>
+          </a:path>
+        </a:gradFill>
+        <a:gradFill rotWithShape="1">
+          <a:gsLst>
+            <a:gs pos="0">
+              <a:schemeClr val="phClr">
+                <a:tint val="80000"/>
+                <a:satMod val="300000"/>
+              </a:schemeClr>
+            </a:gs>
+            <a:gs pos="100000">
+              <a:schemeClr val="phClr">
+                <a:shade val="30000"/>
+                <a:satMod val="200000"/>
+              </a:schemeClr>
+            </a:gs>
+          </a:gsLst>
+          <a:path path="circle">
+            <a:fillToRect l="50000" t="50000" r="50000" b="50000"/>
+          </a:path>
+        </a:gradFill>
+      </a:bgFillStyleLst>
+    </a:fmtScheme>
+  </a:themeElements>
+  <a:objectDefaults>
+    <a:spDef>
+      <a:spPr/>
+      <a:bodyPr/>
+      <a:lstStyle/>
+      <a:style>
+        <a:lnRef idx="1">
+          <a:schemeClr val="accent1"/>
+        </a:lnRef>
+        <a:fillRef idx="3">
+          <a:schemeClr val="accent1"/>
+        </a:fillRef>
+        <a:effectRef idx="2">
+          <a:schemeClr val="accent1"/>
+        </a:effectRef>
+        <a:fontRef idx="minor">
+          <a:schemeClr val="lt1"/>
+        </a:fontRef>
+      </a:style>
+    </a:spDef>
+    <a:lnDef>
+      <a:spPr/>
+      <a:bodyPr/>
+      <a:lstStyle/>
+      <a:style>
+        <a:lnRef idx="2">
+          <a:schemeClr val="accent1"/>
+        </a:lnRef>
+        <a:fillRef idx="0">
+          <a:schemeClr val="accent1"/>
+        </a:fillRef>
+        <a:effectRef idx="1">
+          <a:schemeClr val="accent1"/>
+        </a:effectRef>
+        <a:fontRef idx="minor">
+          <a:schemeClr val="tx1"/>
+        </a:fontRef>
+      </a:style>
+    </a:lnDef>
+  </a:objectDefaults>
+  <a:extraClrSchemeLst/>
+</a:theme>
 </file>
</xml_diff>

<commit_message>
Added study group meeting times to MDTP orientation talk
</commit_message>
<xml_diff>
--- a/info/20170830-MDTPorientation.pptx
+++ b/info/20170830-MDTPorientation.pptx
@@ -3968,7 +3968,9 @@
         </p:nvSpPr>
         <p:spPr/>
         <p:txBody>
-          <a:bodyPr/>
+          <a:bodyPr>
+            <a:normAutofit fontScale="92500" lnSpcReduction="10000"/>
+          </a:bodyPr>
           <a:lstStyle/>
           <a:p>
             <a:r>
@@ -3985,8 +3987,19 @@
           <a:p>
             <a:r>
               <a:rPr lang="en-US" dirty="0" smtClean="0"/>
-              <a:t>Topics decided on based on group interests</a:t>
-            </a:r>
+              <a:t>Topics decided on based on group </a:t>
+            </a:r>
+            <a:r>
+              <a:rPr lang="en-US" dirty="0" smtClean="0"/>
+              <a:t>interests</a:t>
+            </a:r>
+          </a:p>
+          <a:p>
+            <a:r>
+              <a:rPr lang="en-US" dirty="0" smtClean="0"/>
+              <a:t>Meet on Thursdays at 2pm in MSB 5503</a:t>
+            </a:r>
+            <a:endParaRPr lang="en-US" dirty="0" smtClean="0"/>
           </a:p>
           <a:p>
             <a:r>
@@ -4001,8 +4014,13 @@
             <a:pPr lvl="1"/>
             <a:r>
               <a:rPr lang="en-US" dirty="0" smtClean="0"/>
-              <a:t>Meets on every other XXX at YYY in ZZZ</a:t>
-            </a:r>
+              <a:t>Starts on Sept. 21</a:t>
+            </a:r>
+            <a:r>
+              <a:rPr lang="en-US" baseline="30000" dirty="0" smtClean="0"/>
+              <a:t>st</a:t>
+            </a:r>
+            <a:endParaRPr lang="en-US" dirty="0" smtClean="0"/>
           </a:p>
           <a:p>
             <a:r>
@@ -4017,8 +4035,17 @@
             <a:pPr lvl="1"/>
             <a:r>
               <a:rPr lang="en-US" dirty="0" smtClean="0"/>
-              <a:t>Meets on every other XXX at YYY in ZZZ</a:t>
-            </a:r>
+              <a:t>Starts on Sept. 28</a:t>
+            </a:r>
+            <a:r>
+              <a:rPr lang="en-US" baseline="30000" dirty="0" smtClean="0"/>
+              <a:t>th</a:t>
+            </a:r>
+            <a:r>
+              <a:rPr lang="en-US" dirty="0" smtClean="0"/>
+              <a:t> </a:t>
+            </a:r>
+            <a:endParaRPr lang="en-US" dirty="0" smtClean="0"/>
           </a:p>
           <a:p>
             <a:pPr lvl="1"/>

</xml_diff>

<commit_message>
Updated based on feedback from Elizabeth
</commit_message>
<xml_diff>
--- a/info/20170830-MDTPorientation.pptx
+++ b/info/20170830-MDTPorientation.pptx
@@ -5,7 +5,7 @@
     <p:sldMasterId id="2147483648" r:id="rId1"/>
   </p:sldMasterIdLst>
   <p:notesMasterIdLst>
-    <p:notesMasterId r:id="rId11"/>
+    <p:notesMasterId r:id="rId12"/>
   </p:notesMasterIdLst>
   <p:sldIdLst>
     <p:sldId id="256" r:id="rId2"/>
@@ -17,6 +17,7 @@
     <p:sldId id="263" r:id="rId8"/>
     <p:sldId id="264" r:id="rId9"/>
     <p:sldId id="265" r:id="rId10"/>
+    <p:sldId id="266" r:id="rId11"/>
   </p:sldIdLst>
   <p:sldSz cx="9144000" cy="6858000" type="screen4x3"/>
   <p:notesSz cx="6858000" cy="9144000"/>
@@ -3518,6 +3519,128 @@
 </p:sld>
 </file>
 
+<file path=ppt/slides/slide10.xml><?xml version="1.0" encoding="utf-8"?>
+<p:sld xmlns:a="http://schemas.openxmlformats.org/drawingml/2006/main" xmlns:r="http://schemas.openxmlformats.org/officeDocument/2006/relationships" xmlns:p="http://schemas.openxmlformats.org/presentationml/2006/main">
+  <p:cSld>
+    <p:spTree>
+      <p:nvGrpSpPr>
+        <p:cNvPr id="1" name=""/>
+        <p:cNvGrpSpPr/>
+        <p:nvPr/>
+      </p:nvGrpSpPr>
+      <p:grpSpPr>
+        <a:xfrm>
+          <a:off x="0" y="0"/>
+          <a:ext cx="0" cy="0"/>
+          <a:chOff x="0" y="0"/>
+          <a:chExt cx="0" cy="0"/>
+        </a:xfrm>
+      </p:grpSpPr>
+      <p:sp>
+        <p:nvSpPr>
+          <p:cNvPr id="2" name="Title 1"/>
+          <p:cNvSpPr>
+            <a:spLocks noGrp="1"/>
+          </p:cNvSpPr>
+          <p:nvPr>
+            <p:ph type="title"/>
+          </p:nvPr>
+        </p:nvSpPr>
+        <p:spPr>
+          <a:xfrm>
+            <a:off x="457200" y="109357"/>
+            <a:ext cx="8229600" cy="1143000"/>
+          </a:xfrm>
+        </p:spPr>
+        <p:txBody>
+          <a:bodyPr/>
+          <a:lstStyle/>
+          <a:p>
+            <a:r>
+              <a:rPr lang="en-US" dirty="0" err="1" smtClean="0"/>
+              <a:t>ComBEE</a:t>
+            </a:r>
+            <a:endParaRPr lang="en-US" dirty="0"/>
+          </a:p>
+        </p:txBody>
+      </p:sp>
+      <p:sp>
+        <p:nvSpPr>
+          <p:cNvPr id="3" name="Content Placeholder 2"/>
+          <p:cNvSpPr>
+            <a:spLocks noGrp="1"/>
+          </p:cNvSpPr>
+          <p:nvPr>
+            <p:ph sz="half" idx="1"/>
+          </p:nvPr>
+        </p:nvSpPr>
+        <p:spPr>
+          <a:xfrm>
+            <a:off x="300634" y="1252357"/>
+            <a:ext cx="8386165" cy="5132637"/>
+          </a:xfrm>
+        </p:spPr>
+        <p:txBody>
+          <a:bodyPr>
+            <a:normAutofit/>
+          </a:bodyPr>
+          <a:lstStyle/>
+          <a:p>
+            <a:r>
+              <a:rPr lang="en-US" sz="3600" dirty="0" smtClean="0"/>
+              <a:t>Computational Biology, Ecology, and Evolution Group</a:t>
+            </a:r>
+          </a:p>
+          <a:p>
+            <a:r>
+              <a:rPr lang="en-US" sz="3600" dirty="0" smtClean="0"/>
+              <a:t>Social </a:t>
+            </a:r>
+            <a:r>
+              <a:rPr lang="en-US" sz="3600" dirty="0" smtClean="0"/>
+              <a:t>gathering Sept. 15th @ 4pm in 6201 MSB</a:t>
+            </a:r>
+          </a:p>
+          <a:p>
+            <a:r>
+              <a:rPr lang="en-US" sz="3600" dirty="0" smtClean="0"/>
+              <a:t>Bi-weekly R/python study groups</a:t>
+            </a:r>
+          </a:p>
+          <a:p>
+            <a:r>
+              <a:rPr lang="en-US" sz="3600" dirty="0" smtClean="0">
+                <a:hlinkClick r:id="rId2"/>
+              </a:rPr>
+              <a:t>https://combee-uw-madison.github.io</a:t>
+            </a:r>
+            <a:endParaRPr lang="en-US" sz="3600" dirty="0" smtClean="0"/>
+          </a:p>
+          <a:p>
+            <a:pPr lvl="1"/>
+            <a:r>
+              <a:rPr lang="en-US" sz="3200" dirty="0" smtClean="0"/>
+              <a:t>Sign up for our listserv to get updates!</a:t>
+            </a:r>
+          </a:p>
+          <a:p>
+            <a:endParaRPr lang="en-US" sz="3600" dirty="0" smtClean="0"/>
+          </a:p>
+        </p:txBody>
+      </p:sp>
+    </p:spTree>
+    <p:extLst>
+      <p:ext uri="{BB962C8B-B14F-4D97-AF65-F5344CB8AC3E}">
+        <p14:creationId xmlns:p14="http://schemas.microsoft.com/office/powerpoint/2010/main" val="3917604799"/>
+      </p:ext>
+    </p:extLst>
+  </p:cSld>
+  <p:clrMapOvr>
+    <a:masterClrMapping/>
+  </p:clrMapOvr>
+</p:sld>
+</file>
+
 <file path=ppt/slides/slide2.xml><?xml version="1.0" encoding="utf-8"?>
 <p:sld xmlns:a="http://schemas.openxmlformats.org/drawingml/2006/main" xmlns:r="http://schemas.openxmlformats.org/officeDocument/2006/relationships" xmlns:p="http://schemas.openxmlformats.org/presentationml/2006/main">
   <p:cSld>
@@ -3969,7 +4092,7 @@
         <p:spPr/>
         <p:txBody>
           <a:bodyPr>
-            <a:normAutofit fontScale="92500" lnSpcReduction="10000"/>
+            <a:normAutofit fontScale="85000" lnSpcReduction="20000"/>
           </a:bodyPr>
           <a:lstStyle/>
           <a:p>
@@ -4051,8 +4174,27 @@
             <a:pPr lvl="1"/>
             <a:r>
               <a:rPr lang="en-US" dirty="0" smtClean="0"/>
-              <a:t>Different format this semester</a:t>
-            </a:r>
+              <a:t>Different format this </a:t>
+            </a:r>
+            <a:r>
+              <a:rPr lang="en-US" dirty="0" smtClean="0"/>
+              <a:t>semester</a:t>
+            </a:r>
+          </a:p>
+          <a:p>
+            <a:r>
+              <a:rPr lang="en-US" dirty="0" smtClean="0"/>
+              <a:t>Sign up for their individual </a:t>
+            </a:r>
+            <a:r>
+              <a:rPr lang="en-US" dirty="0" err="1" smtClean="0"/>
+              <a:t>listservs</a:t>
+            </a:r>
+            <a:r>
+              <a:rPr lang="en-US" dirty="0" smtClean="0"/>
+              <a:t> if you are interested</a:t>
+            </a:r>
+            <a:endParaRPr lang="en-US" dirty="0" smtClean="0"/>
           </a:p>
         </p:txBody>
       </p:sp>
@@ -5027,7 +5169,7 @@
           <a:p>
             <a:r>
               <a:rPr lang="en-US" dirty="0" smtClean="0"/>
-              <a:t>Initiative to bring together quantities biology on campus</a:t>
+              <a:t>Initiative to bring together quantitative biology on campus</a:t>
             </a:r>
           </a:p>
           <a:p>
@@ -5061,24 +5203,16 @@
           <a:p>
             <a:pPr lvl="1"/>
             <a:r>
-              <a:rPr lang="en-US" dirty="0"/>
-              <a:t>https://</a:t>
-            </a:r>
-            <a:r>
-              <a:rPr lang="en-US" dirty="0" err="1"/>
-              <a:t>qbi.wisc.edu</a:t>
-            </a:r>
-            <a:r>
-              <a:rPr lang="en-US" dirty="0"/>
-              <a:t>/education/</a:t>
-            </a:r>
-            <a:r>
-              <a:rPr lang="en-US" dirty="0" err="1"/>
-              <a:t>phd</a:t>
-            </a:r>
-            <a:r>
-              <a:rPr lang="en-US" dirty="0"/>
-              <a:t>-minor/</a:t>
+              <a:rPr lang="en-US" dirty="0">
+                <a:hlinkClick r:id="rId3"/>
+              </a:rPr>
+              <a:t>https://qbi.wisc.edu/education/phd-minor</a:t>
+            </a:r>
+            <a:r>
+              <a:rPr lang="en-US" dirty="0" smtClean="0">
+                <a:hlinkClick r:id="rId3"/>
+              </a:rPr>
+              <a:t>/</a:t>
             </a:r>
             <a:endParaRPr lang="en-US" dirty="0" smtClean="0"/>
           </a:p>
@@ -5091,13 +5225,18 @@
           <a:p>
             <a:pPr lvl="1"/>
             <a:r>
-              <a:rPr lang="en-US" dirty="0"/>
+              <a:rPr lang="en-US" dirty="0">
+                <a:hlinkClick r:id="rId4"/>
+              </a:rPr>
               <a:t>https://wid.wisc.edu/seminars/qbio</a:t>
             </a:r>
             <a:r>
-              <a:rPr lang="en-US" dirty="0" smtClean="0"/>
+              <a:rPr lang="en-US" dirty="0" smtClean="0">
+                <a:hlinkClick r:id="rId4"/>
+              </a:rPr>
               <a:t>/</a:t>
             </a:r>
+            <a:endParaRPr lang="en-US" dirty="0" smtClean="0"/>
           </a:p>
         </p:txBody>
       </p:sp>

</xml_diff>

<commit_message>
Added biotech center workshop slide to MDTP orientation talk
</commit_message>
<xml_diff>
--- a/info/20170830-MDTPorientation.pptx
+++ b/info/20170830-MDTPorientation.pptx
@@ -5,7 +5,7 @@
     <p:sldMasterId id="2147483648" r:id="rId1"/>
   </p:sldMasterIdLst>
   <p:notesMasterIdLst>
-    <p:notesMasterId r:id="rId12"/>
+    <p:notesMasterId r:id="rId13"/>
   </p:notesMasterIdLst>
   <p:sldIdLst>
     <p:sldId id="256" r:id="rId2"/>
@@ -17,7 +17,8 @@
     <p:sldId id="263" r:id="rId8"/>
     <p:sldId id="264" r:id="rId9"/>
     <p:sldId id="265" r:id="rId10"/>
-    <p:sldId id="266" r:id="rId11"/>
+    <p:sldId id="267" r:id="rId11"/>
+    <p:sldId id="266" r:id="rId12"/>
   </p:sldIdLst>
   <p:sldSz cx="9144000" cy="6858000" type="screen4x3"/>
   <p:notesSz cx="6858000" cy="9144000"/>
@@ -3546,6 +3547,107 @@
             <p:ph type="title"/>
           </p:nvPr>
         </p:nvSpPr>
+        <p:spPr/>
+        <p:txBody>
+          <a:bodyPr/>
+          <a:lstStyle/>
+          <a:p>
+            <a:r>
+              <a:rPr lang="en-US" dirty="0" smtClean="0"/>
+              <a:t>Biotech Center</a:t>
+            </a:r>
+            <a:endParaRPr lang="en-US" dirty="0"/>
+          </a:p>
+        </p:txBody>
+      </p:sp>
+      <p:sp>
+        <p:nvSpPr>
+          <p:cNvPr id="3" name="Content Placeholder 2"/>
+          <p:cNvSpPr>
+            <a:spLocks noGrp="1"/>
+          </p:cNvSpPr>
+          <p:nvPr>
+            <p:ph idx="1"/>
+          </p:nvPr>
+        </p:nvSpPr>
+        <p:spPr/>
+        <p:txBody>
+          <a:bodyPr/>
+          <a:lstStyle/>
+          <a:p>
+            <a:r>
+              <a:rPr lang="en-US" dirty="0" smtClean="0"/>
+              <a:t>Biotech Center on campus also offers Bioinformatics workshops for a cost</a:t>
+            </a:r>
+          </a:p>
+          <a:p>
+            <a:r>
+              <a:rPr lang="en-US" dirty="0" smtClean="0"/>
+              <a:t>http</a:t>
+            </a:r>
+            <a:r>
+              <a:rPr lang="en-US" dirty="0"/>
+              <a:t>://</a:t>
+            </a:r>
+            <a:r>
+              <a:rPr lang="en-US" dirty="0" err="1"/>
+              <a:t>www.biotech.wisc.edu</a:t>
+            </a:r>
+            <a:r>
+              <a:rPr lang="en-US" dirty="0"/>
+              <a:t>/services/</a:t>
+            </a:r>
+            <a:r>
+              <a:rPr lang="en-US" dirty="0" err="1"/>
+              <a:t>brc</a:t>
+            </a:r>
+            <a:r>
+              <a:rPr lang="en-US" dirty="0"/>
+              <a:t>/workshop</a:t>
+            </a:r>
+          </a:p>
+        </p:txBody>
+      </p:sp>
+    </p:spTree>
+    <p:extLst>
+      <p:ext uri="{BB962C8B-B14F-4D97-AF65-F5344CB8AC3E}">
+        <p14:creationId xmlns:p14="http://schemas.microsoft.com/office/powerpoint/2010/main" val="3287427549"/>
+      </p:ext>
+    </p:extLst>
+  </p:cSld>
+  <p:clrMapOvr>
+    <a:masterClrMapping/>
+  </p:clrMapOvr>
+</p:sld>
+</file>
+
+<file path=ppt/slides/slide11.xml><?xml version="1.0" encoding="utf-8"?>
+<p:sld xmlns:a="http://schemas.openxmlformats.org/drawingml/2006/main" xmlns:r="http://schemas.openxmlformats.org/officeDocument/2006/relationships" xmlns:p="http://schemas.openxmlformats.org/presentationml/2006/main">
+  <p:cSld>
+    <p:spTree>
+      <p:nvGrpSpPr>
+        <p:cNvPr id="1" name=""/>
+        <p:cNvGrpSpPr/>
+        <p:nvPr/>
+      </p:nvGrpSpPr>
+      <p:grpSpPr>
+        <a:xfrm>
+          <a:off x="0" y="0"/>
+          <a:ext cx="0" cy="0"/>
+          <a:chOff x="0" y="0"/>
+          <a:chExt cx="0" cy="0"/>
+        </a:xfrm>
+      </p:grpSpPr>
+      <p:sp>
+        <p:nvSpPr>
+          <p:cNvPr id="2" name="Title 1"/>
+          <p:cNvSpPr>
+            <a:spLocks noGrp="1"/>
+          </p:cNvSpPr>
+          <p:nvPr>
+            <p:ph type="title"/>
+          </p:nvPr>
+        </p:nvSpPr>
         <p:spPr>
           <a:xfrm>
             <a:off x="457200" y="109357"/>
@@ -3594,11 +3696,7 @@
           <a:p>
             <a:r>
               <a:rPr lang="en-US" sz="3600" dirty="0" smtClean="0"/>
-              <a:t>Social </a:t>
-            </a:r>
-            <a:r>
-              <a:rPr lang="en-US" sz="3600" dirty="0" smtClean="0"/>
-              <a:t>gathering Sept. 15th @ 4pm in 6201 MSB</a:t>
+              <a:t>Social gathering Sept. 15th @ 4pm in 6201 MSB</a:t>
             </a:r>
           </a:p>
           <a:p>
@@ -4110,11 +4208,7 @@
           <a:p>
             <a:r>
               <a:rPr lang="en-US" dirty="0" smtClean="0"/>
-              <a:t>Topics decided on based on group </a:t>
-            </a:r>
-            <a:r>
-              <a:rPr lang="en-US" dirty="0" smtClean="0"/>
-              <a:t>interests</a:t>
+              <a:t>Topics decided on based on group interests</a:t>
             </a:r>
           </a:p>
           <a:p>
@@ -4122,7 +4216,6 @@
               <a:rPr lang="en-US" dirty="0" smtClean="0"/>
               <a:t>Meet on Thursdays at 2pm in MSB 5503</a:t>
             </a:r>
-            <a:endParaRPr lang="en-US" dirty="0" smtClean="0"/>
           </a:p>
           <a:p>
             <a:r>
@@ -4168,17 +4261,12 @@
               <a:rPr lang="en-US" dirty="0" smtClean="0"/>
               <a:t> </a:t>
             </a:r>
-            <a:endParaRPr lang="en-US" dirty="0" smtClean="0"/>
           </a:p>
           <a:p>
             <a:pPr lvl="1"/>
             <a:r>
               <a:rPr lang="en-US" dirty="0" smtClean="0"/>
-              <a:t>Different format this </a:t>
-            </a:r>
-            <a:r>
-              <a:rPr lang="en-US" dirty="0" smtClean="0"/>
-              <a:t>semester</a:t>
+              <a:t>Different format this semester</a:t>
             </a:r>
           </a:p>
           <a:p>
@@ -4194,7 +4282,6 @@
               <a:rPr lang="en-US" dirty="0" smtClean="0"/>
               <a:t> if you are interested</a:t>
             </a:r>
-            <a:endParaRPr lang="en-US" dirty="0" smtClean="0"/>
           </a:p>
         </p:txBody>
       </p:sp>

</xml_diff>

<commit_message>
Updated workshops avail in MDTP orientation talk
</commit_message>
<xml_diff>
--- a/info/20170830-MDTPorientation.pptx
+++ b/info/20170830-MDTPorientation.pptx
@@ -202,7 +202,7 @@
           <a:p>
             <a:fld id="{A67DFD92-C269-184E-9D9F-A8BC0EBA8EF9}" type="datetimeFigureOut">
               <a:rPr lang="en-US" smtClean="0"/>
-              <a:t>8/15/17</a:t>
+              <a:t>8/16/17</a:t>
             </a:fld>
             <a:endParaRPr lang="en-US"/>
           </a:p>
@@ -651,7 +651,7 @@
           <a:p>
             <a:fld id="{3CAC6C92-91BE-8D4B-B983-8E5F7037845D}" type="datetimeFigureOut">
               <a:rPr lang="en-US" smtClean="0"/>
-              <a:t>8/15/17</a:t>
+              <a:t>8/16/17</a:t>
             </a:fld>
             <a:endParaRPr lang="en-US"/>
           </a:p>
@@ -821,7 +821,7 @@
           <a:p>
             <a:fld id="{3CAC6C92-91BE-8D4B-B983-8E5F7037845D}" type="datetimeFigureOut">
               <a:rPr lang="en-US" smtClean="0"/>
-              <a:t>8/15/17</a:t>
+              <a:t>8/16/17</a:t>
             </a:fld>
             <a:endParaRPr lang="en-US"/>
           </a:p>
@@ -1001,7 +1001,7 @@
           <a:p>
             <a:fld id="{3CAC6C92-91BE-8D4B-B983-8E5F7037845D}" type="datetimeFigureOut">
               <a:rPr lang="en-US" smtClean="0"/>
-              <a:t>8/15/17</a:t>
+              <a:t>8/16/17</a:t>
             </a:fld>
             <a:endParaRPr lang="en-US"/>
           </a:p>
@@ -1171,7 +1171,7 @@
           <a:p>
             <a:fld id="{3CAC6C92-91BE-8D4B-B983-8E5F7037845D}" type="datetimeFigureOut">
               <a:rPr lang="en-US" smtClean="0"/>
-              <a:t>8/15/17</a:t>
+              <a:t>8/16/17</a:t>
             </a:fld>
             <a:endParaRPr lang="en-US"/>
           </a:p>
@@ -1417,7 +1417,7 @@
           <a:p>
             <a:fld id="{3CAC6C92-91BE-8D4B-B983-8E5F7037845D}" type="datetimeFigureOut">
               <a:rPr lang="en-US" smtClean="0"/>
-              <a:t>8/15/17</a:t>
+              <a:t>8/16/17</a:t>
             </a:fld>
             <a:endParaRPr lang="en-US"/>
           </a:p>
@@ -1705,7 +1705,7 @@
           <a:p>
             <a:fld id="{3CAC6C92-91BE-8D4B-B983-8E5F7037845D}" type="datetimeFigureOut">
               <a:rPr lang="en-US" smtClean="0"/>
-              <a:t>8/15/17</a:t>
+              <a:t>8/16/17</a:t>
             </a:fld>
             <a:endParaRPr lang="en-US"/>
           </a:p>
@@ -2127,7 +2127,7 @@
           <a:p>
             <a:fld id="{3CAC6C92-91BE-8D4B-B983-8E5F7037845D}" type="datetimeFigureOut">
               <a:rPr lang="en-US" smtClean="0"/>
-              <a:t>8/15/17</a:t>
+              <a:t>8/16/17</a:t>
             </a:fld>
             <a:endParaRPr lang="en-US"/>
           </a:p>
@@ -2245,7 +2245,7 @@
           <a:p>
             <a:fld id="{3CAC6C92-91BE-8D4B-B983-8E5F7037845D}" type="datetimeFigureOut">
               <a:rPr lang="en-US" smtClean="0"/>
-              <a:t>8/15/17</a:t>
+              <a:t>8/16/17</a:t>
             </a:fld>
             <a:endParaRPr lang="en-US"/>
           </a:p>
@@ -2340,7 +2340,7 @@
           <a:p>
             <a:fld id="{3CAC6C92-91BE-8D4B-B983-8E5F7037845D}" type="datetimeFigureOut">
               <a:rPr lang="en-US" smtClean="0"/>
-              <a:t>8/15/17</a:t>
+              <a:t>8/16/17</a:t>
             </a:fld>
             <a:endParaRPr lang="en-US"/>
           </a:p>
@@ -2617,7 +2617,7 @@
           <a:p>
             <a:fld id="{3CAC6C92-91BE-8D4B-B983-8E5F7037845D}" type="datetimeFigureOut">
               <a:rPr lang="en-US" smtClean="0"/>
-              <a:t>8/15/17</a:t>
+              <a:t>8/16/17</a:t>
             </a:fld>
             <a:endParaRPr lang="en-US"/>
           </a:p>
@@ -2870,7 +2870,7 @@
           <a:p>
             <a:fld id="{3CAC6C92-91BE-8D4B-B983-8E5F7037845D}" type="datetimeFigureOut">
               <a:rPr lang="en-US" smtClean="0"/>
-              <a:t>8/15/17</a:t>
+              <a:t>8/16/17</a:t>
             </a:fld>
             <a:endParaRPr lang="en-US"/>
           </a:p>
@@ -3083,7 +3083,7 @@
           <a:p>
             <a:fld id="{3CAC6C92-91BE-8D4B-B983-8E5F7037845D}" type="datetimeFigureOut">
               <a:rPr lang="en-US" smtClean="0"/>
-              <a:t>8/15/17</a:t>
+              <a:t>8/16/17</a:t>
             </a:fld>
             <a:endParaRPr lang="en-US"/>
           </a:p>
@@ -3572,39 +3572,93 @@
         </p:nvSpPr>
         <p:spPr/>
         <p:txBody>
-          <a:bodyPr/>
-          <a:lstStyle/>
-          <a:p>
-            <a:r>
-              <a:rPr lang="en-US" dirty="0" smtClean="0"/>
-              <a:t>Biotech Center on campus also offers Bioinformatics workshops for a cost</a:t>
-            </a:r>
-          </a:p>
-          <a:p>
-            <a:r>
-              <a:rPr lang="en-US" dirty="0" smtClean="0"/>
+          <a:bodyPr>
+            <a:normAutofit lnSpcReduction="10000"/>
+          </a:bodyPr>
+          <a:lstStyle/>
+          <a:p>
+            <a:r>
+              <a:rPr lang="en-US" dirty="0" smtClean="0"/>
+              <a:t>Biotech Center on campus also offers Bioinformatics workshops </a:t>
+            </a:r>
+            <a:r>
+              <a:rPr lang="en-US" dirty="0" smtClean="0"/>
+              <a:t>(cost $$)</a:t>
+            </a:r>
+          </a:p>
+          <a:p>
+            <a:r>
+              <a:rPr lang="en-US" dirty="0" smtClean="0"/>
+              <a:t>Workshops include:</a:t>
+            </a:r>
+          </a:p>
+          <a:p>
+            <a:pPr lvl="1"/>
+            <a:r>
+              <a:rPr lang="en-US" dirty="0"/>
+              <a:t>Linux Basics for NGS Data Analysis</a:t>
+            </a:r>
+            <a:endParaRPr lang="en-US" dirty="0" smtClean="0"/>
+          </a:p>
+          <a:p>
+            <a:pPr lvl="1"/>
+            <a:r>
+              <a:rPr lang="en-US" dirty="0"/>
+              <a:t>Intro to NGS Data </a:t>
+            </a:r>
+            <a:r>
+              <a:rPr lang="en-US" dirty="0" smtClean="0"/>
+              <a:t>Analysis</a:t>
+            </a:r>
+          </a:p>
+          <a:p>
+            <a:pPr lvl="1"/>
+            <a:r>
+              <a:rPr lang="en-US" dirty="0" err="1"/>
+              <a:t>Microbiota</a:t>
+            </a:r>
+            <a:r>
+              <a:rPr lang="en-US" dirty="0"/>
+              <a:t> Processing in </a:t>
+            </a:r>
+            <a:r>
+              <a:rPr lang="en-US" dirty="0" err="1" smtClean="0"/>
+              <a:t>mothur</a:t>
+            </a:r>
+            <a:endParaRPr lang="en-US" dirty="0" smtClean="0"/>
+          </a:p>
+          <a:p>
+            <a:pPr lvl="1"/>
+            <a:r>
+              <a:rPr lang="en-US" dirty="0" err="1"/>
+              <a:t>Microbiota</a:t>
+            </a:r>
+            <a:r>
+              <a:rPr lang="en-US" dirty="0"/>
+              <a:t> Analysis in R</a:t>
+            </a:r>
+            <a:endParaRPr lang="en-US" dirty="0" smtClean="0"/>
+          </a:p>
+          <a:p>
+            <a:r>
+              <a:rPr lang="en-US" dirty="0" smtClean="0">
+                <a:hlinkClick r:id="rId2"/>
+              </a:rPr>
               <a:t>http</a:t>
             </a:r>
             <a:r>
-              <a:rPr lang="en-US" dirty="0"/>
-              <a:t>://</a:t>
-            </a:r>
-            <a:r>
-              <a:rPr lang="en-US" dirty="0" err="1"/>
-              <a:t>www.biotech.wisc.edu</a:t>
-            </a:r>
-            <a:r>
-              <a:rPr lang="en-US" dirty="0"/>
-              <a:t>/services/</a:t>
-            </a:r>
-            <a:r>
-              <a:rPr lang="en-US" dirty="0" err="1"/>
-              <a:t>brc</a:t>
-            </a:r>
-            <a:r>
-              <a:rPr lang="en-US" dirty="0"/>
-              <a:t>/workshop</a:t>
-            </a:r>
+              <a:rPr lang="en-US" dirty="0">
+                <a:hlinkClick r:id="rId2"/>
+              </a:rPr>
+              <a:t>://www.biotech.wisc.edu/services/brc/</a:t>
+            </a:r>
+            <a:r>
+              <a:rPr lang="en-US" dirty="0" smtClean="0">
+                <a:hlinkClick r:id="rId2"/>
+              </a:rPr>
+              <a:t>workshop</a:t>
+            </a:r>
+            <a:endParaRPr lang="en-US" dirty="0" smtClean="0"/>
           </a:p>
         </p:txBody>
       </p:sp>
@@ -4978,7 +5032,12 @@
             <p:ph type="title"/>
           </p:nvPr>
         </p:nvSpPr>
-        <p:spPr/>
+        <p:spPr>
+          <a:xfrm>
+            <a:off x="457200" y="180885"/>
+            <a:ext cx="8229600" cy="1143000"/>
+          </a:xfrm>
+        </p:spPr>
         <p:txBody>
           <a:bodyPr/>
           <a:lstStyle/>
@@ -5001,57 +5060,109 @@
             <p:ph idx="1"/>
           </p:nvPr>
         </p:nvSpPr>
-        <p:spPr/>
+        <p:spPr>
+          <a:xfrm>
+            <a:off x="406055" y="1525657"/>
+            <a:ext cx="8612217" cy="4943471"/>
+          </a:xfrm>
+        </p:spPr>
         <p:txBody>
           <a:bodyPr>
-            <a:normAutofit fontScale="92500" lnSpcReduction="20000"/>
+            <a:noAutofit/>
           </a:bodyPr>
           <a:lstStyle/>
           <a:p>
             <a:r>
-              <a:rPr lang="en-US" dirty="0" smtClean="0"/>
-              <a:t>2 workshops hosted at beginning of each semester</a:t>
+              <a:rPr lang="en-US" sz="2600" dirty="0" smtClean="0"/>
+              <a:t>2 </a:t>
+            </a:r>
+            <a:r>
+              <a:rPr lang="en-US" sz="2600" dirty="0" smtClean="0"/>
+              <a:t>free workshops </a:t>
+            </a:r>
+            <a:r>
+              <a:rPr lang="en-US" sz="2600" dirty="0" smtClean="0"/>
+              <a:t>hosted at beginning of each semester</a:t>
             </a:r>
           </a:p>
           <a:p>
             <a:pPr lvl="1"/>
             <a:r>
-              <a:rPr lang="en-US" dirty="0" smtClean="0"/>
-              <a:t>Next workshops probably January 2018</a:t>
-            </a:r>
-          </a:p>
-          <a:p>
-            <a:r>
-              <a:rPr lang="en-US" dirty="0" smtClean="0"/>
-              <a:t>Large local community of instructors</a:t>
-            </a:r>
-          </a:p>
-          <a:p>
-            <a:r>
-              <a:rPr lang="en-US" dirty="0" smtClean="0"/>
+              <a:rPr lang="en-US" sz="2600" dirty="0" smtClean="0"/>
+              <a:t>Next workshops probably January </a:t>
+            </a:r>
+            <a:r>
+              <a:rPr lang="en-US" sz="2600" dirty="0" smtClean="0"/>
+              <a:t>2018</a:t>
+            </a:r>
+          </a:p>
+          <a:p>
+            <a:pPr lvl="1"/>
+            <a:r>
+              <a:rPr lang="en-US" sz="2600" dirty="0" smtClean="0"/>
+              <a:t>SWC: Unix shell, python (or R), and version control (</a:t>
+            </a:r>
+            <a:r>
+              <a:rPr lang="en-US" sz="2600" dirty="0" err="1" smtClean="0"/>
+              <a:t>git</a:t>
+            </a:r>
+            <a:r>
+              <a:rPr lang="en-US" sz="2600" dirty="0" smtClean="0"/>
+              <a:t>)</a:t>
+            </a:r>
+            <a:endParaRPr lang="en-US" sz="2600" dirty="0" smtClean="0"/>
+          </a:p>
+          <a:p>
+            <a:pPr lvl="1"/>
+            <a:r>
+              <a:rPr lang="en-US" sz="2600" dirty="0" smtClean="0"/>
+              <a:t>DC: excel, </a:t>
+            </a:r>
+            <a:r>
+              <a:rPr lang="en-US" sz="2600" dirty="0" err="1" smtClean="0"/>
+              <a:t>openRefine</a:t>
+            </a:r>
+            <a:r>
+              <a:rPr lang="en-US" sz="2600" dirty="0" smtClean="0"/>
+              <a:t>, SQL, R</a:t>
+            </a:r>
+          </a:p>
+          <a:p>
+            <a:r>
+              <a:rPr lang="en-US" sz="2600" dirty="0" smtClean="0"/>
+              <a:t>Large </a:t>
+            </a:r>
+            <a:r>
+              <a:rPr lang="en-US" sz="2600" dirty="0" smtClean="0"/>
+              <a:t>local community of instructors</a:t>
+            </a:r>
+          </a:p>
+          <a:p>
+            <a:r>
+              <a:rPr lang="en-US" sz="2600" dirty="0" smtClean="0"/>
               <a:t>If interested you can help out or instruct these workshops</a:t>
             </a:r>
           </a:p>
           <a:p>
             <a:pPr lvl="1"/>
             <a:r>
-              <a:rPr lang="en-US" dirty="0" smtClean="0"/>
+              <a:rPr lang="en-US" sz="2600" dirty="0" smtClean="0"/>
               <a:t>Professional Development/Teaching opportunity</a:t>
             </a:r>
           </a:p>
           <a:p>
             <a:r>
-              <a:rPr lang="en-US" dirty="0" smtClean="0"/>
+              <a:rPr lang="en-US" sz="2600" dirty="0" smtClean="0"/>
               <a:t>For updates about registration (and other computational events on campus) sign up for ACI (advanced computing initiative) listserv </a:t>
             </a:r>
           </a:p>
           <a:p>
             <a:pPr lvl="1"/>
             <a:r>
-              <a:rPr lang="en-US" dirty="0" err="1"/>
+              <a:rPr lang="en-US" sz="2600" dirty="0" err="1"/>
               <a:t>aci.wisc.edu</a:t>
             </a:r>
-            <a:endParaRPr lang="en-US" dirty="0"/>
+            <a:endParaRPr lang="en-US" sz="2600" dirty="0"/>
           </a:p>
         </p:txBody>
       </p:sp>

</xml_diff>

<commit_message>
Fixed typo on CHTC slide of MDTP orienation talk
</commit_message>
<xml_diff>
--- a/info/20170830-MDTPorientation.pptx
+++ b/info/20170830-MDTPorientation.pptx
@@ -3579,11 +3579,7 @@
           <a:p>
             <a:r>
               <a:rPr lang="en-US" dirty="0" smtClean="0"/>
-              <a:t>Biotech Center on campus also offers Bioinformatics workshops </a:t>
-            </a:r>
-            <a:r>
-              <a:rPr lang="en-US" dirty="0" smtClean="0"/>
-              <a:t>(cost $$)</a:t>
+              <a:t>Biotech Center on campus also offers Bioinformatics workshops (cost $$)</a:t>
             </a:r>
           </a:p>
           <a:p>
@@ -5074,26 +5070,14 @@
           <a:p>
             <a:r>
               <a:rPr lang="en-US" sz="2600" dirty="0" smtClean="0"/>
-              <a:t>2 </a:t>
-            </a:r>
+              <a:t>2 free workshops hosted at beginning of each semester</a:t>
+            </a:r>
+          </a:p>
+          <a:p>
+            <a:pPr lvl="1"/>
             <a:r>
               <a:rPr lang="en-US" sz="2600" dirty="0" smtClean="0"/>
-              <a:t>free workshops </a:t>
-            </a:r>
-            <a:r>
-              <a:rPr lang="en-US" sz="2600" dirty="0" smtClean="0"/>
-              <a:t>hosted at beginning of each semester</a:t>
-            </a:r>
-          </a:p>
-          <a:p>
-            <a:pPr lvl="1"/>
-            <a:r>
-              <a:rPr lang="en-US" sz="2600" dirty="0" smtClean="0"/>
-              <a:t>Next workshops probably January </a:t>
-            </a:r>
-            <a:r>
-              <a:rPr lang="en-US" sz="2600" dirty="0" smtClean="0"/>
-              <a:t>2018</a:t>
+              <a:t>Next workshops probably January 2018</a:t>
             </a:r>
           </a:p>
           <a:p>
@@ -5110,7 +5094,6 @@
               <a:rPr lang="en-US" sz="2600" dirty="0" smtClean="0"/>
               <a:t>)</a:t>
             </a:r>
-            <a:endParaRPr lang="en-US" sz="2600" dirty="0" smtClean="0"/>
           </a:p>
           <a:p>
             <a:pPr lvl="1"/>
@@ -5130,11 +5113,7 @@
           <a:p>
             <a:r>
               <a:rPr lang="en-US" sz="2600" dirty="0" smtClean="0"/>
-              <a:t>Large </a:t>
-            </a:r>
-            <a:r>
-              <a:rPr lang="en-US" sz="2600" dirty="0" smtClean="0"/>
-              <a:t>local community of instructors</a:t>
+              <a:t>Large local community of instructors</a:t>
             </a:r>
           </a:p>
           <a:p>
@@ -5215,7 +5194,19 @@
           <a:p>
             <a:r>
               <a:rPr lang="en-US" dirty="0" smtClean="0"/>
-              <a:t>Center for High Through-put Computing (CHTC)</a:t>
+              <a:t>Center for </a:t>
+            </a:r>
+            <a:r>
+              <a:rPr lang="en-US" smtClean="0"/>
+              <a:t>High </a:t>
+            </a:r>
+            <a:r>
+              <a:rPr lang="en-US" smtClean="0"/>
+              <a:t>Throughput </a:t>
+            </a:r>
+            <a:r>
+              <a:rPr lang="en-US" dirty="0" smtClean="0"/>
+              <a:t>Computing (CHTC)</a:t>
             </a:r>
             <a:endParaRPr lang="en-US" dirty="0"/>
           </a:p>

</xml_diff>

<commit_message>
added animations to orientation slides
</commit_message>
<xml_diff>
--- a/info/20170830-MDTPorientation.pptx
+++ b/info/20170830-MDTPorientation.pptx
@@ -117,6 +117,22 @@
       </a:defRPr>
     </a:lvl9pPr>
   </p:defaultTextStyle>
+  <p:extLst>
+    <p:ext uri="{EFAFB233-063F-42B5-8137-9DF3F51BA10A}">
+      <p15:sldGuideLst xmlns:p15="http://schemas.microsoft.com/office/powerpoint/2012/main">
+        <p15:guide id="1" orient="horz" pos="2160">
+          <p15:clr>
+            <a:srgbClr val="A4A3A4"/>
+          </p15:clr>
+        </p15:guide>
+        <p15:guide id="2" pos="2880">
+          <p15:clr>
+            <a:srgbClr val="A4A3A4"/>
+          </p15:clr>
+        </p15:guide>
+      </p15:sldGuideLst>
+    </p:ext>
+  </p:extLst>
 </p:presentation>
 </file>
 
@@ -202,7 +218,7 @@
           <a:p>
             <a:fld id="{A67DFD92-C269-184E-9D9F-A8BC0EBA8EF9}" type="datetimeFigureOut">
               <a:rPr lang="en-US" smtClean="0"/>
-              <a:t>8/16/17</a:t>
+              <a:t>8/30/17</a:t>
             </a:fld>
             <a:endParaRPr lang="en-US"/>
           </a:p>
@@ -651,7 +667,7 @@
           <a:p>
             <a:fld id="{3CAC6C92-91BE-8D4B-B983-8E5F7037845D}" type="datetimeFigureOut">
               <a:rPr lang="en-US" smtClean="0"/>
-              <a:t>8/16/17</a:t>
+              <a:t>8/30/17</a:t>
             </a:fld>
             <a:endParaRPr lang="en-US"/>
           </a:p>
@@ -821,7 +837,7 @@
           <a:p>
             <a:fld id="{3CAC6C92-91BE-8D4B-B983-8E5F7037845D}" type="datetimeFigureOut">
               <a:rPr lang="en-US" smtClean="0"/>
-              <a:t>8/16/17</a:t>
+              <a:t>8/30/17</a:t>
             </a:fld>
             <a:endParaRPr lang="en-US"/>
           </a:p>
@@ -1001,7 +1017,7 @@
           <a:p>
             <a:fld id="{3CAC6C92-91BE-8D4B-B983-8E5F7037845D}" type="datetimeFigureOut">
               <a:rPr lang="en-US" smtClean="0"/>
-              <a:t>8/16/17</a:t>
+              <a:t>8/30/17</a:t>
             </a:fld>
             <a:endParaRPr lang="en-US"/>
           </a:p>
@@ -1171,7 +1187,7 @@
           <a:p>
             <a:fld id="{3CAC6C92-91BE-8D4B-B983-8E5F7037845D}" type="datetimeFigureOut">
               <a:rPr lang="en-US" smtClean="0"/>
-              <a:t>8/16/17</a:t>
+              <a:t>8/30/17</a:t>
             </a:fld>
             <a:endParaRPr lang="en-US"/>
           </a:p>
@@ -1417,7 +1433,7 @@
           <a:p>
             <a:fld id="{3CAC6C92-91BE-8D4B-B983-8E5F7037845D}" type="datetimeFigureOut">
               <a:rPr lang="en-US" smtClean="0"/>
-              <a:t>8/16/17</a:t>
+              <a:t>8/30/17</a:t>
             </a:fld>
             <a:endParaRPr lang="en-US"/>
           </a:p>
@@ -1705,7 +1721,7 @@
           <a:p>
             <a:fld id="{3CAC6C92-91BE-8D4B-B983-8E5F7037845D}" type="datetimeFigureOut">
               <a:rPr lang="en-US" smtClean="0"/>
-              <a:t>8/16/17</a:t>
+              <a:t>8/30/17</a:t>
             </a:fld>
             <a:endParaRPr lang="en-US"/>
           </a:p>
@@ -2127,7 +2143,7 @@
           <a:p>
             <a:fld id="{3CAC6C92-91BE-8D4B-B983-8E5F7037845D}" type="datetimeFigureOut">
               <a:rPr lang="en-US" smtClean="0"/>
-              <a:t>8/16/17</a:t>
+              <a:t>8/30/17</a:t>
             </a:fld>
             <a:endParaRPr lang="en-US"/>
           </a:p>
@@ -2245,7 +2261,7 @@
           <a:p>
             <a:fld id="{3CAC6C92-91BE-8D4B-B983-8E5F7037845D}" type="datetimeFigureOut">
               <a:rPr lang="en-US" smtClean="0"/>
-              <a:t>8/16/17</a:t>
+              <a:t>8/30/17</a:t>
             </a:fld>
             <a:endParaRPr lang="en-US"/>
           </a:p>
@@ -2340,7 +2356,7 @@
           <a:p>
             <a:fld id="{3CAC6C92-91BE-8D4B-B983-8E5F7037845D}" type="datetimeFigureOut">
               <a:rPr lang="en-US" smtClean="0"/>
-              <a:t>8/16/17</a:t>
+              <a:t>8/30/17</a:t>
             </a:fld>
             <a:endParaRPr lang="en-US"/>
           </a:p>
@@ -2617,7 +2633,7 @@
           <a:p>
             <a:fld id="{3CAC6C92-91BE-8D4B-B983-8E5F7037845D}" type="datetimeFigureOut">
               <a:rPr lang="en-US" smtClean="0"/>
-              <a:t>8/16/17</a:t>
+              <a:t>8/30/17</a:t>
             </a:fld>
             <a:endParaRPr lang="en-US"/>
           </a:p>
@@ -2870,7 +2886,7 @@
           <a:p>
             <a:fld id="{3CAC6C92-91BE-8D4B-B983-8E5F7037845D}" type="datetimeFigureOut">
               <a:rPr lang="en-US" smtClean="0"/>
-              <a:t>8/16/17</a:t>
+              <a:t>8/30/17</a:t>
             </a:fld>
             <a:endParaRPr lang="en-US"/>
           </a:p>
@@ -3083,7 +3099,7 @@
           <a:p>
             <a:fld id="{3CAC6C92-91BE-8D4B-B983-8E5F7037845D}" type="datetimeFigureOut">
               <a:rPr lang="en-US" smtClean="0"/>
-              <a:t>8/16/17</a:t>
+              <a:t>8/30/17</a:t>
             </a:fld>
             <a:endParaRPr lang="en-US"/>
           </a:p>
@@ -3517,6 +3533,13 @@
   <p:clrMapOvr>
     <a:masterClrMapping/>
   </p:clrMapOvr>
+  <p:timing>
+    <p:tnLst>
+      <p:par>
+        <p:cTn id="1" dur="indefinite" restart="never" nodeType="tmRoot"/>
+      </p:par>
+    </p:tnLst>
+  </p:timing>
 </p:sld>
 </file>
 
@@ -3668,6 +3691,307 @@
   <p:clrMapOvr>
     <a:masterClrMapping/>
   </p:clrMapOvr>
+  <p:timing>
+    <p:tnLst>
+      <p:par>
+        <p:cTn id="1" dur="indefinite" restart="never" nodeType="tmRoot">
+          <p:childTnLst>
+            <p:seq concurrent="1" nextAc="seek">
+              <p:cTn id="2" dur="indefinite" nodeType="mainSeq">
+                <p:childTnLst>
+                  <p:par>
+                    <p:cTn id="3" fill="hold">
+                      <p:stCondLst>
+                        <p:cond delay="indefinite"/>
+                      </p:stCondLst>
+                      <p:childTnLst>
+                        <p:par>
+                          <p:cTn id="4" fill="hold">
+                            <p:stCondLst>
+                              <p:cond delay="0"/>
+                            </p:stCondLst>
+                            <p:childTnLst>
+                              <p:par>
+                                <p:cTn id="5" presetID="1" presetClass="entr" presetSubtype="0" fill="hold" nodeType="clickEffect">
+                                  <p:stCondLst>
+                                    <p:cond delay="0"/>
+                                  </p:stCondLst>
+                                  <p:childTnLst>
+                                    <p:set>
+                                      <p:cBhvr>
+                                        <p:cTn id="6" dur="1" fill="hold">
+                                          <p:stCondLst>
+                                            <p:cond delay="0"/>
+                                          </p:stCondLst>
+                                        </p:cTn>
+                                        <p:tgtEl>
+                                          <p:spTgt spid="3">
+                                            <p:txEl>
+                                              <p:pRg st="0" end="0"/>
+                                            </p:txEl>
+                                          </p:spTgt>
+                                        </p:tgtEl>
+                                        <p:attrNameLst>
+                                          <p:attrName>style.visibility</p:attrName>
+                                        </p:attrNameLst>
+                                      </p:cBhvr>
+                                      <p:to>
+                                        <p:strVal val="visible"/>
+                                      </p:to>
+                                    </p:set>
+                                  </p:childTnLst>
+                                </p:cTn>
+                              </p:par>
+                            </p:childTnLst>
+                          </p:cTn>
+                        </p:par>
+                      </p:childTnLst>
+                    </p:cTn>
+                  </p:par>
+                  <p:par>
+                    <p:cTn id="7" fill="hold">
+                      <p:stCondLst>
+                        <p:cond delay="indefinite"/>
+                      </p:stCondLst>
+                      <p:childTnLst>
+                        <p:par>
+                          <p:cTn id="8" fill="hold">
+                            <p:stCondLst>
+                              <p:cond delay="0"/>
+                            </p:stCondLst>
+                            <p:childTnLst>
+                              <p:par>
+                                <p:cTn id="9" presetID="1" presetClass="entr" presetSubtype="0" fill="hold" nodeType="clickEffect">
+                                  <p:stCondLst>
+                                    <p:cond delay="0"/>
+                                  </p:stCondLst>
+                                  <p:childTnLst>
+                                    <p:set>
+                                      <p:cBhvr>
+                                        <p:cTn id="10" dur="1" fill="hold">
+                                          <p:stCondLst>
+                                            <p:cond delay="0"/>
+                                          </p:stCondLst>
+                                        </p:cTn>
+                                        <p:tgtEl>
+                                          <p:spTgt spid="3">
+                                            <p:txEl>
+                                              <p:pRg st="1" end="1"/>
+                                            </p:txEl>
+                                          </p:spTgt>
+                                        </p:tgtEl>
+                                        <p:attrNameLst>
+                                          <p:attrName>style.visibility</p:attrName>
+                                        </p:attrNameLst>
+                                      </p:cBhvr>
+                                      <p:to>
+                                        <p:strVal val="visible"/>
+                                      </p:to>
+                                    </p:set>
+                                  </p:childTnLst>
+                                </p:cTn>
+                              </p:par>
+                              <p:par>
+                                <p:cTn id="11" presetID="1" presetClass="entr" presetSubtype="0" fill="hold" nodeType="withEffect">
+                                  <p:stCondLst>
+                                    <p:cond delay="0"/>
+                                  </p:stCondLst>
+                                  <p:childTnLst>
+                                    <p:set>
+                                      <p:cBhvr>
+                                        <p:cTn id="12" dur="1" fill="hold">
+                                          <p:stCondLst>
+                                            <p:cond delay="0"/>
+                                          </p:stCondLst>
+                                        </p:cTn>
+                                        <p:tgtEl>
+                                          <p:spTgt spid="3">
+                                            <p:txEl>
+                                              <p:pRg st="2" end="2"/>
+                                            </p:txEl>
+                                          </p:spTgt>
+                                        </p:tgtEl>
+                                        <p:attrNameLst>
+                                          <p:attrName>style.visibility</p:attrName>
+                                        </p:attrNameLst>
+                                      </p:cBhvr>
+                                      <p:to>
+                                        <p:strVal val="visible"/>
+                                      </p:to>
+                                    </p:set>
+                                  </p:childTnLst>
+                                </p:cTn>
+                              </p:par>
+                              <p:par>
+                                <p:cTn id="13" presetID="1" presetClass="entr" presetSubtype="0" fill="hold" nodeType="withEffect">
+                                  <p:stCondLst>
+                                    <p:cond delay="0"/>
+                                  </p:stCondLst>
+                                  <p:childTnLst>
+                                    <p:set>
+                                      <p:cBhvr>
+                                        <p:cTn id="14" dur="1" fill="hold">
+                                          <p:stCondLst>
+                                            <p:cond delay="0"/>
+                                          </p:stCondLst>
+                                        </p:cTn>
+                                        <p:tgtEl>
+                                          <p:spTgt spid="3">
+                                            <p:txEl>
+                                              <p:pRg st="3" end="3"/>
+                                            </p:txEl>
+                                          </p:spTgt>
+                                        </p:tgtEl>
+                                        <p:attrNameLst>
+                                          <p:attrName>style.visibility</p:attrName>
+                                        </p:attrNameLst>
+                                      </p:cBhvr>
+                                      <p:to>
+                                        <p:strVal val="visible"/>
+                                      </p:to>
+                                    </p:set>
+                                  </p:childTnLst>
+                                </p:cTn>
+                              </p:par>
+                              <p:par>
+                                <p:cTn id="15" presetID="1" presetClass="entr" presetSubtype="0" fill="hold" nodeType="withEffect">
+                                  <p:stCondLst>
+                                    <p:cond delay="0"/>
+                                  </p:stCondLst>
+                                  <p:childTnLst>
+                                    <p:set>
+                                      <p:cBhvr>
+                                        <p:cTn id="16" dur="1" fill="hold">
+                                          <p:stCondLst>
+                                            <p:cond delay="0"/>
+                                          </p:stCondLst>
+                                        </p:cTn>
+                                        <p:tgtEl>
+                                          <p:spTgt spid="3">
+                                            <p:txEl>
+                                              <p:pRg st="4" end="4"/>
+                                            </p:txEl>
+                                          </p:spTgt>
+                                        </p:tgtEl>
+                                        <p:attrNameLst>
+                                          <p:attrName>style.visibility</p:attrName>
+                                        </p:attrNameLst>
+                                      </p:cBhvr>
+                                      <p:to>
+                                        <p:strVal val="visible"/>
+                                      </p:to>
+                                    </p:set>
+                                  </p:childTnLst>
+                                </p:cTn>
+                              </p:par>
+                              <p:par>
+                                <p:cTn id="17" presetID="1" presetClass="entr" presetSubtype="0" fill="hold" nodeType="withEffect">
+                                  <p:stCondLst>
+                                    <p:cond delay="0"/>
+                                  </p:stCondLst>
+                                  <p:childTnLst>
+                                    <p:set>
+                                      <p:cBhvr>
+                                        <p:cTn id="18" dur="1" fill="hold">
+                                          <p:stCondLst>
+                                            <p:cond delay="0"/>
+                                          </p:stCondLst>
+                                        </p:cTn>
+                                        <p:tgtEl>
+                                          <p:spTgt spid="3">
+                                            <p:txEl>
+                                              <p:pRg st="5" end="5"/>
+                                            </p:txEl>
+                                          </p:spTgt>
+                                        </p:tgtEl>
+                                        <p:attrNameLst>
+                                          <p:attrName>style.visibility</p:attrName>
+                                        </p:attrNameLst>
+                                      </p:cBhvr>
+                                      <p:to>
+                                        <p:strVal val="visible"/>
+                                      </p:to>
+                                    </p:set>
+                                  </p:childTnLst>
+                                </p:cTn>
+                              </p:par>
+                            </p:childTnLst>
+                          </p:cTn>
+                        </p:par>
+                      </p:childTnLst>
+                    </p:cTn>
+                  </p:par>
+                  <p:par>
+                    <p:cTn id="19" fill="hold">
+                      <p:stCondLst>
+                        <p:cond delay="indefinite"/>
+                      </p:stCondLst>
+                      <p:childTnLst>
+                        <p:par>
+                          <p:cTn id="20" fill="hold">
+                            <p:stCondLst>
+                              <p:cond delay="0"/>
+                            </p:stCondLst>
+                            <p:childTnLst>
+                              <p:par>
+                                <p:cTn id="21" presetID="1" presetClass="entr" presetSubtype="0" fill="hold" nodeType="clickEffect">
+                                  <p:stCondLst>
+                                    <p:cond delay="0"/>
+                                  </p:stCondLst>
+                                  <p:childTnLst>
+                                    <p:set>
+                                      <p:cBhvr>
+                                        <p:cTn id="22" dur="1" fill="hold">
+                                          <p:stCondLst>
+                                            <p:cond delay="0"/>
+                                          </p:stCondLst>
+                                        </p:cTn>
+                                        <p:tgtEl>
+                                          <p:spTgt spid="3">
+                                            <p:txEl>
+                                              <p:pRg st="6" end="6"/>
+                                            </p:txEl>
+                                          </p:spTgt>
+                                        </p:tgtEl>
+                                        <p:attrNameLst>
+                                          <p:attrName>style.visibility</p:attrName>
+                                        </p:attrNameLst>
+                                      </p:cBhvr>
+                                      <p:to>
+                                        <p:strVal val="visible"/>
+                                      </p:to>
+                                    </p:set>
+                                  </p:childTnLst>
+                                </p:cTn>
+                              </p:par>
+                            </p:childTnLst>
+                          </p:cTn>
+                        </p:par>
+                      </p:childTnLst>
+                    </p:cTn>
+                  </p:par>
+                </p:childTnLst>
+              </p:cTn>
+              <p:prevCondLst>
+                <p:cond evt="onPrev" delay="0">
+                  <p:tgtEl>
+                    <p:sldTgt/>
+                  </p:tgtEl>
+                </p:cond>
+              </p:prevCondLst>
+              <p:nextCondLst>
+                <p:cond evt="onNext" delay="0">
+                  <p:tgtEl>
+                    <p:sldTgt/>
+                  </p:tgtEl>
+                </p:cond>
+              </p:nextCondLst>
+            </p:seq>
+          </p:childTnLst>
+        </p:cTn>
+      </p:par>
+    </p:tnLst>
+  </p:timing>
 </p:sld>
 </file>
 
@@ -3786,6 +4110,13 @@
   <p:clrMapOvr>
     <a:masterClrMapping/>
   </p:clrMapOvr>
+  <p:timing>
+    <p:tnLst>
+      <p:par>
+        <p:cTn id="1" dur="indefinite" restart="never" nodeType="tmRoot"/>
+      </p:par>
+    </p:tnLst>
+  </p:timing>
 </p:sld>
 </file>
 
@@ -3894,6 +4225,281 @@
   <p:clrMapOvr>
     <a:masterClrMapping/>
   </p:clrMapOvr>
+  <p:timing>
+    <p:tnLst>
+      <p:par>
+        <p:cTn id="1" dur="indefinite" restart="never" nodeType="tmRoot">
+          <p:childTnLst>
+            <p:seq concurrent="1" nextAc="seek">
+              <p:cTn id="2" dur="indefinite" nodeType="mainSeq">
+                <p:childTnLst>
+                  <p:par>
+                    <p:cTn id="3" fill="hold">
+                      <p:stCondLst>
+                        <p:cond delay="indefinite"/>
+                      </p:stCondLst>
+                      <p:childTnLst>
+                        <p:par>
+                          <p:cTn id="4" fill="hold">
+                            <p:stCondLst>
+                              <p:cond delay="0"/>
+                            </p:stCondLst>
+                            <p:childTnLst>
+                              <p:par>
+                                <p:cTn id="5" presetID="1" presetClass="entr" presetSubtype="0" fill="hold" nodeType="clickEffect">
+                                  <p:stCondLst>
+                                    <p:cond delay="0"/>
+                                  </p:stCondLst>
+                                  <p:childTnLst>
+                                    <p:set>
+                                      <p:cBhvr>
+                                        <p:cTn id="6" dur="1" fill="hold">
+                                          <p:stCondLst>
+                                            <p:cond delay="0"/>
+                                          </p:stCondLst>
+                                        </p:cTn>
+                                        <p:tgtEl>
+                                          <p:spTgt spid="3">
+                                            <p:txEl>
+                                              <p:pRg st="0" end="0"/>
+                                            </p:txEl>
+                                          </p:spTgt>
+                                        </p:tgtEl>
+                                        <p:attrNameLst>
+                                          <p:attrName>style.visibility</p:attrName>
+                                        </p:attrNameLst>
+                                      </p:cBhvr>
+                                      <p:to>
+                                        <p:strVal val="visible"/>
+                                      </p:to>
+                                    </p:set>
+                                  </p:childTnLst>
+                                </p:cTn>
+                              </p:par>
+                            </p:childTnLst>
+                          </p:cTn>
+                        </p:par>
+                      </p:childTnLst>
+                    </p:cTn>
+                  </p:par>
+                  <p:par>
+                    <p:cTn id="7" fill="hold">
+                      <p:stCondLst>
+                        <p:cond delay="indefinite"/>
+                      </p:stCondLst>
+                      <p:childTnLst>
+                        <p:par>
+                          <p:cTn id="8" fill="hold">
+                            <p:stCondLst>
+                              <p:cond delay="0"/>
+                            </p:stCondLst>
+                            <p:childTnLst>
+                              <p:par>
+                                <p:cTn id="9" presetID="1" presetClass="entr" presetSubtype="0" fill="hold" nodeType="clickEffect">
+                                  <p:stCondLst>
+                                    <p:cond delay="0"/>
+                                  </p:stCondLst>
+                                  <p:childTnLst>
+                                    <p:set>
+                                      <p:cBhvr>
+                                        <p:cTn id="10" dur="1" fill="hold">
+                                          <p:stCondLst>
+                                            <p:cond delay="0"/>
+                                          </p:stCondLst>
+                                        </p:cTn>
+                                        <p:tgtEl>
+                                          <p:spTgt spid="3">
+                                            <p:txEl>
+                                              <p:pRg st="1" end="1"/>
+                                            </p:txEl>
+                                          </p:spTgt>
+                                        </p:tgtEl>
+                                        <p:attrNameLst>
+                                          <p:attrName>style.visibility</p:attrName>
+                                        </p:attrNameLst>
+                                      </p:cBhvr>
+                                      <p:to>
+                                        <p:strVal val="visible"/>
+                                      </p:to>
+                                    </p:set>
+                                  </p:childTnLst>
+                                </p:cTn>
+                              </p:par>
+                            </p:childTnLst>
+                          </p:cTn>
+                        </p:par>
+                      </p:childTnLst>
+                    </p:cTn>
+                  </p:par>
+                  <p:par>
+                    <p:cTn id="11" fill="hold">
+                      <p:stCondLst>
+                        <p:cond delay="indefinite"/>
+                      </p:stCondLst>
+                      <p:childTnLst>
+                        <p:par>
+                          <p:cTn id="12" fill="hold">
+                            <p:stCondLst>
+                              <p:cond delay="0"/>
+                            </p:stCondLst>
+                            <p:childTnLst>
+                              <p:par>
+                                <p:cTn id="13" presetID="1" presetClass="entr" presetSubtype="0" fill="hold" nodeType="clickEffect">
+                                  <p:stCondLst>
+                                    <p:cond delay="0"/>
+                                  </p:stCondLst>
+                                  <p:childTnLst>
+                                    <p:set>
+                                      <p:cBhvr>
+                                        <p:cTn id="14" dur="1" fill="hold">
+                                          <p:stCondLst>
+                                            <p:cond delay="0"/>
+                                          </p:stCondLst>
+                                        </p:cTn>
+                                        <p:tgtEl>
+                                          <p:spTgt spid="3">
+                                            <p:txEl>
+                                              <p:pRg st="2" end="2"/>
+                                            </p:txEl>
+                                          </p:spTgt>
+                                        </p:tgtEl>
+                                        <p:attrNameLst>
+                                          <p:attrName>style.visibility</p:attrName>
+                                        </p:attrNameLst>
+                                      </p:cBhvr>
+                                      <p:to>
+                                        <p:strVal val="visible"/>
+                                      </p:to>
+                                    </p:set>
+                                  </p:childTnLst>
+                                </p:cTn>
+                              </p:par>
+                            </p:childTnLst>
+                          </p:cTn>
+                        </p:par>
+                      </p:childTnLst>
+                    </p:cTn>
+                  </p:par>
+                  <p:par>
+                    <p:cTn id="15" fill="hold">
+                      <p:stCondLst>
+                        <p:cond delay="indefinite"/>
+                      </p:stCondLst>
+                      <p:childTnLst>
+                        <p:par>
+                          <p:cTn id="16" fill="hold">
+                            <p:stCondLst>
+                              <p:cond delay="0"/>
+                            </p:stCondLst>
+                            <p:childTnLst>
+                              <p:par>
+                                <p:cTn id="17" presetID="1" presetClass="entr" presetSubtype="0" fill="hold" nodeType="clickEffect">
+                                  <p:stCondLst>
+                                    <p:cond delay="0"/>
+                                  </p:stCondLst>
+                                  <p:childTnLst>
+                                    <p:set>
+                                      <p:cBhvr>
+                                        <p:cTn id="18" dur="1" fill="hold">
+                                          <p:stCondLst>
+                                            <p:cond delay="0"/>
+                                          </p:stCondLst>
+                                        </p:cTn>
+                                        <p:tgtEl>
+                                          <p:spTgt spid="3">
+                                            <p:txEl>
+                                              <p:pRg st="3" end="3"/>
+                                            </p:txEl>
+                                          </p:spTgt>
+                                        </p:tgtEl>
+                                        <p:attrNameLst>
+                                          <p:attrName>style.visibility</p:attrName>
+                                        </p:attrNameLst>
+                                      </p:cBhvr>
+                                      <p:to>
+                                        <p:strVal val="visible"/>
+                                      </p:to>
+                                    </p:set>
+                                  </p:childTnLst>
+                                </p:cTn>
+                              </p:par>
+                            </p:childTnLst>
+                          </p:cTn>
+                        </p:par>
+                      </p:childTnLst>
+                    </p:cTn>
+                  </p:par>
+                  <p:par>
+                    <p:cTn id="19" fill="hold">
+                      <p:stCondLst>
+                        <p:cond delay="indefinite"/>
+                      </p:stCondLst>
+                      <p:childTnLst>
+                        <p:par>
+                          <p:cTn id="20" fill="hold">
+                            <p:stCondLst>
+                              <p:cond delay="0"/>
+                            </p:stCondLst>
+                            <p:childTnLst>
+                              <p:par>
+                                <p:cTn id="21" presetID="1" presetClass="entr" presetSubtype="0" fill="hold" nodeType="clickEffect">
+                                  <p:stCondLst>
+                                    <p:cond delay="0"/>
+                                  </p:stCondLst>
+                                  <p:childTnLst>
+                                    <p:set>
+                                      <p:cBhvr>
+                                        <p:cTn id="22" dur="1" fill="hold">
+                                          <p:stCondLst>
+                                            <p:cond delay="0"/>
+                                          </p:stCondLst>
+                                        </p:cTn>
+                                        <p:tgtEl>
+                                          <p:spTgt spid="3">
+                                            <p:txEl>
+                                              <p:pRg st="4" end="4"/>
+                                            </p:txEl>
+                                          </p:spTgt>
+                                        </p:tgtEl>
+                                        <p:attrNameLst>
+                                          <p:attrName>style.visibility</p:attrName>
+                                        </p:attrNameLst>
+                                      </p:cBhvr>
+                                      <p:to>
+                                        <p:strVal val="visible"/>
+                                      </p:to>
+                                    </p:set>
+                                  </p:childTnLst>
+                                </p:cTn>
+                              </p:par>
+                            </p:childTnLst>
+                          </p:cTn>
+                        </p:par>
+                      </p:childTnLst>
+                    </p:cTn>
+                  </p:par>
+                </p:childTnLst>
+              </p:cTn>
+              <p:prevCondLst>
+                <p:cond evt="onPrev" delay="0">
+                  <p:tgtEl>
+                    <p:sldTgt/>
+                  </p:tgtEl>
+                </p:cond>
+              </p:prevCondLst>
+              <p:nextCondLst>
+                <p:cond evt="onNext" delay="0">
+                  <p:tgtEl>
+                    <p:sldTgt/>
+                  </p:tgtEl>
+                </p:cond>
+              </p:nextCondLst>
+            </p:seq>
+          </p:childTnLst>
+        </p:cTn>
+      </p:par>
+    </p:tnLst>
+  </p:timing>
 </p:sld>
 </file>
 
@@ -4180,6 +4786,294 @@
   <p:clrMapOvr>
     <a:masterClrMapping/>
   </p:clrMapOvr>
+  <p:timing>
+    <p:tnLst>
+      <p:par>
+        <p:cTn id="1" dur="indefinite" restart="never" nodeType="tmRoot">
+          <p:childTnLst>
+            <p:seq concurrent="1" nextAc="seek">
+              <p:cTn id="2" dur="indefinite" nodeType="mainSeq">
+                <p:childTnLst>
+                  <p:par>
+                    <p:cTn id="3" fill="hold">
+                      <p:stCondLst>
+                        <p:cond delay="indefinite"/>
+                      </p:stCondLst>
+                      <p:childTnLst>
+                        <p:par>
+                          <p:cTn id="4" fill="hold">
+                            <p:stCondLst>
+                              <p:cond delay="0"/>
+                            </p:stCondLst>
+                            <p:childTnLst>
+                              <p:par>
+                                <p:cTn id="5" presetID="1" presetClass="entr" presetSubtype="0" fill="hold" nodeType="clickEffect">
+                                  <p:stCondLst>
+                                    <p:cond delay="0"/>
+                                  </p:stCondLst>
+                                  <p:childTnLst>
+                                    <p:set>
+                                      <p:cBhvr>
+                                        <p:cTn id="6" dur="1" fill="hold">
+                                          <p:stCondLst>
+                                            <p:cond delay="0"/>
+                                          </p:stCondLst>
+                                        </p:cTn>
+                                        <p:tgtEl>
+                                          <p:spTgt spid="3">
+                                            <p:txEl>
+                                              <p:pRg st="1" end="1"/>
+                                            </p:txEl>
+                                          </p:spTgt>
+                                        </p:tgtEl>
+                                        <p:attrNameLst>
+                                          <p:attrName>style.visibility</p:attrName>
+                                        </p:attrNameLst>
+                                      </p:cBhvr>
+                                      <p:to>
+                                        <p:strVal val="visible"/>
+                                      </p:to>
+                                    </p:set>
+                                  </p:childTnLst>
+                                </p:cTn>
+                              </p:par>
+                            </p:childTnLst>
+                          </p:cTn>
+                        </p:par>
+                      </p:childTnLst>
+                    </p:cTn>
+                  </p:par>
+                  <p:par>
+                    <p:cTn id="7" fill="hold">
+                      <p:stCondLst>
+                        <p:cond delay="indefinite"/>
+                      </p:stCondLst>
+                      <p:childTnLst>
+                        <p:par>
+                          <p:cTn id="8" fill="hold">
+                            <p:stCondLst>
+                              <p:cond delay="0"/>
+                            </p:stCondLst>
+                            <p:childTnLst>
+                              <p:par>
+                                <p:cTn id="9" presetID="1" presetClass="entr" presetSubtype="0" fill="hold" nodeType="clickEffect">
+                                  <p:stCondLst>
+                                    <p:cond delay="0"/>
+                                  </p:stCondLst>
+                                  <p:childTnLst>
+                                    <p:set>
+                                      <p:cBhvr>
+                                        <p:cTn id="10" dur="1" fill="hold">
+                                          <p:stCondLst>
+                                            <p:cond delay="0"/>
+                                          </p:stCondLst>
+                                        </p:cTn>
+                                        <p:tgtEl>
+                                          <p:spTgt spid="3">
+                                            <p:txEl>
+                                              <p:pRg st="2" end="2"/>
+                                            </p:txEl>
+                                          </p:spTgt>
+                                        </p:tgtEl>
+                                        <p:attrNameLst>
+                                          <p:attrName>style.visibility</p:attrName>
+                                        </p:attrNameLst>
+                                      </p:cBhvr>
+                                      <p:to>
+                                        <p:strVal val="visible"/>
+                                      </p:to>
+                                    </p:set>
+                                  </p:childTnLst>
+                                </p:cTn>
+                              </p:par>
+                            </p:childTnLst>
+                          </p:cTn>
+                        </p:par>
+                      </p:childTnLst>
+                    </p:cTn>
+                  </p:par>
+                  <p:par>
+                    <p:cTn id="11" fill="hold">
+                      <p:stCondLst>
+                        <p:cond delay="indefinite"/>
+                      </p:stCondLst>
+                      <p:childTnLst>
+                        <p:par>
+                          <p:cTn id="12" fill="hold">
+                            <p:stCondLst>
+                              <p:cond delay="0"/>
+                            </p:stCondLst>
+                            <p:childTnLst>
+                              <p:par>
+                                <p:cTn id="13" presetID="1" presetClass="entr" presetSubtype="0" fill="hold" nodeType="clickEffect">
+                                  <p:stCondLst>
+                                    <p:cond delay="0"/>
+                                  </p:stCondLst>
+                                  <p:childTnLst>
+                                    <p:set>
+                                      <p:cBhvr>
+                                        <p:cTn id="14" dur="1" fill="hold">
+                                          <p:stCondLst>
+                                            <p:cond delay="0"/>
+                                          </p:stCondLst>
+                                        </p:cTn>
+                                        <p:tgtEl>
+                                          <p:spTgt spid="3">
+                                            <p:txEl>
+                                              <p:pRg st="3" end="3"/>
+                                            </p:txEl>
+                                          </p:spTgt>
+                                        </p:tgtEl>
+                                        <p:attrNameLst>
+                                          <p:attrName>style.visibility</p:attrName>
+                                        </p:attrNameLst>
+                                      </p:cBhvr>
+                                      <p:to>
+                                        <p:strVal val="visible"/>
+                                      </p:to>
+                                    </p:set>
+                                  </p:childTnLst>
+                                </p:cTn>
+                              </p:par>
+                            </p:childTnLst>
+                          </p:cTn>
+                        </p:par>
+                      </p:childTnLst>
+                    </p:cTn>
+                  </p:par>
+                  <p:par>
+                    <p:cTn id="15" fill="hold">
+                      <p:stCondLst>
+                        <p:cond delay="indefinite"/>
+                      </p:stCondLst>
+                      <p:childTnLst>
+                        <p:par>
+                          <p:cTn id="16" fill="hold">
+                            <p:stCondLst>
+                              <p:cond delay="0"/>
+                            </p:stCondLst>
+                            <p:childTnLst>
+                              <p:par>
+                                <p:cTn id="17" presetID="1" presetClass="entr" presetSubtype="0" fill="hold" nodeType="clickEffect">
+                                  <p:stCondLst>
+                                    <p:cond delay="0"/>
+                                  </p:stCondLst>
+                                  <p:childTnLst>
+                                    <p:set>
+                                      <p:cBhvr>
+                                        <p:cTn id="18" dur="1" fill="hold">
+                                          <p:stCondLst>
+                                            <p:cond delay="0"/>
+                                          </p:stCondLst>
+                                        </p:cTn>
+                                        <p:tgtEl>
+                                          <p:spTgt spid="3">
+                                            <p:txEl>
+                                              <p:pRg st="4" end="4"/>
+                                            </p:txEl>
+                                          </p:spTgt>
+                                        </p:tgtEl>
+                                        <p:attrNameLst>
+                                          <p:attrName>style.visibility</p:attrName>
+                                        </p:attrNameLst>
+                                      </p:cBhvr>
+                                      <p:to>
+                                        <p:strVal val="visible"/>
+                                      </p:to>
+                                    </p:set>
+                                  </p:childTnLst>
+                                </p:cTn>
+                              </p:par>
+                              <p:par>
+                                <p:cTn id="19" presetID="1" presetClass="entr" presetSubtype="0" fill="hold" nodeType="withEffect">
+                                  <p:stCondLst>
+                                    <p:cond delay="0"/>
+                                  </p:stCondLst>
+                                  <p:childTnLst>
+                                    <p:set>
+                                      <p:cBhvr>
+                                        <p:cTn id="20" dur="1" fill="hold">
+                                          <p:stCondLst>
+                                            <p:cond delay="0"/>
+                                          </p:stCondLst>
+                                        </p:cTn>
+                                        <p:tgtEl>
+                                          <p:spTgt spid="3">
+                                            <p:txEl>
+                                              <p:pRg st="5" end="5"/>
+                                            </p:txEl>
+                                          </p:spTgt>
+                                        </p:tgtEl>
+                                        <p:attrNameLst>
+                                          <p:attrName>style.visibility</p:attrName>
+                                        </p:attrNameLst>
+                                      </p:cBhvr>
+                                      <p:to>
+                                        <p:strVal val="visible"/>
+                                      </p:to>
+                                    </p:set>
+                                  </p:childTnLst>
+                                </p:cTn>
+                              </p:par>
+                              <p:par>
+                                <p:cTn id="21" presetID="1" presetClass="entr" presetSubtype="0" fill="hold" nodeType="withEffect">
+                                  <p:stCondLst>
+                                    <p:cond delay="0"/>
+                                  </p:stCondLst>
+                                  <p:childTnLst>
+                                    <p:set>
+                                      <p:cBhvr>
+                                        <p:cTn id="22" dur="1" fill="hold">
+                                          <p:stCondLst>
+                                            <p:cond delay="0"/>
+                                          </p:stCondLst>
+                                        </p:cTn>
+                                        <p:tgtEl>
+                                          <p:spTgt spid="3">
+                                            <p:txEl>
+                                              <p:pRg st="6" end="6"/>
+                                            </p:txEl>
+                                          </p:spTgt>
+                                        </p:tgtEl>
+                                        <p:attrNameLst>
+                                          <p:attrName>style.visibility</p:attrName>
+                                        </p:attrNameLst>
+                                      </p:cBhvr>
+                                      <p:to>
+                                        <p:strVal val="visible"/>
+                                      </p:to>
+                                    </p:set>
+                                  </p:childTnLst>
+                                </p:cTn>
+                              </p:par>
+                            </p:childTnLst>
+                          </p:cTn>
+                        </p:par>
+                      </p:childTnLst>
+                    </p:cTn>
+                  </p:par>
+                </p:childTnLst>
+              </p:cTn>
+              <p:prevCondLst>
+                <p:cond evt="onPrev" delay="0">
+                  <p:tgtEl>
+                    <p:sldTgt/>
+                  </p:tgtEl>
+                </p:cond>
+              </p:prevCondLst>
+              <p:nextCondLst>
+                <p:cond evt="onNext" delay="0">
+                  <p:tgtEl>
+                    <p:sldTgt/>
+                  </p:tgtEl>
+                </p:cond>
+              </p:nextCondLst>
+            </p:seq>
+          </p:childTnLst>
+        </p:cTn>
+      </p:par>
+    </p:tnLst>
+  </p:timing>
 </p:sld>
 </file>
 
@@ -4345,6 +5239,382 @@
   <p:clrMapOvr>
     <a:masterClrMapping/>
   </p:clrMapOvr>
+  <p:timing>
+    <p:tnLst>
+      <p:par>
+        <p:cTn id="1" dur="indefinite" restart="never" nodeType="tmRoot">
+          <p:childTnLst>
+            <p:seq concurrent="1" nextAc="seek">
+              <p:cTn id="2" dur="indefinite" nodeType="mainSeq">
+                <p:childTnLst>
+                  <p:par>
+                    <p:cTn id="3" fill="hold">
+                      <p:stCondLst>
+                        <p:cond delay="indefinite"/>
+                      </p:stCondLst>
+                      <p:childTnLst>
+                        <p:par>
+                          <p:cTn id="4" fill="hold">
+                            <p:stCondLst>
+                              <p:cond delay="0"/>
+                            </p:stCondLst>
+                            <p:childTnLst>
+                              <p:par>
+                                <p:cTn id="5" presetID="1" presetClass="entr" presetSubtype="0" fill="hold" nodeType="clickEffect">
+                                  <p:stCondLst>
+                                    <p:cond delay="0"/>
+                                  </p:stCondLst>
+                                  <p:childTnLst>
+                                    <p:set>
+                                      <p:cBhvr>
+                                        <p:cTn id="6" dur="1" fill="hold">
+                                          <p:stCondLst>
+                                            <p:cond delay="0"/>
+                                          </p:stCondLst>
+                                        </p:cTn>
+                                        <p:tgtEl>
+                                          <p:spTgt spid="5">
+                                            <p:txEl>
+                                              <p:pRg st="0" end="0"/>
+                                            </p:txEl>
+                                          </p:spTgt>
+                                        </p:tgtEl>
+                                        <p:attrNameLst>
+                                          <p:attrName>style.visibility</p:attrName>
+                                        </p:attrNameLst>
+                                      </p:cBhvr>
+                                      <p:to>
+                                        <p:strVal val="visible"/>
+                                      </p:to>
+                                    </p:set>
+                                  </p:childTnLst>
+                                </p:cTn>
+                              </p:par>
+                              <p:par>
+                                <p:cTn id="7" presetID="1" presetClass="entr" presetSubtype="0" fill="hold" nodeType="withEffect">
+                                  <p:stCondLst>
+                                    <p:cond delay="0"/>
+                                  </p:stCondLst>
+                                  <p:childTnLst>
+                                    <p:set>
+                                      <p:cBhvr>
+                                        <p:cTn id="8" dur="1" fill="hold">
+                                          <p:stCondLst>
+                                            <p:cond delay="0"/>
+                                          </p:stCondLst>
+                                        </p:cTn>
+                                        <p:tgtEl>
+                                          <p:spTgt spid="5">
+                                            <p:txEl>
+                                              <p:pRg st="1" end="1"/>
+                                            </p:txEl>
+                                          </p:spTgt>
+                                        </p:tgtEl>
+                                        <p:attrNameLst>
+                                          <p:attrName>style.visibility</p:attrName>
+                                        </p:attrNameLst>
+                                      </p:cBhvr>
+                                      <p:to>
+                                        <p:strVal val="visible"/>
+                                      </p:to>
+                                    </p:set>
+                                  </p:childTnLst>
+                                </p:cTn>
+                              </p:par>
+                              <p:par>
+                                <p:cTn id="9" presetID="1" presetClass="entr" presetSubtype="0" fill="hold" nodeType="withEffect">
+                                  <p:stCondLst>
+                                    <p:cond delay="0"/>
+                                  </p:stCondLst>
+                                  <p:childTnLst>
+                                    <p:set>
+                                      <p:cBhvr>
+                                        <p:cTn id="10" dur="1" fill="hold">
+                                          <p:stCondLst>
+                                            <p:cond delay="0"/>
+                                          </p:stCondLst>
+                                        </p:cTn>
+                                        <p:tgtEl>
+                                          <p:spTgt spid="5">
+                                            <p:txEl>
+                                              <p:pRg st="2" end="2"/>
+                                            </p:txEl>
+                                          </p:spTgt>
+                                        </p:tgtEl>
+                                        <p:attrNameLst>
+                                          <p:attrName>style.visibility</p:attrName>
+                                        </p:attrNameLst>
+                                      </p:cBhvr>
+                                      <p:to>
+                                        <p:strVal val="visible"/>
+                                      </p:to>
+                                    </p:set>
+                                  </p:childTnLst>
+                                </p:cTn>
+                              </p:par>
+                              <p:par>
+                                <p:cTn id="11" presetID="1" presetClass="entr" presetSubtype="0" fill="hold" nodeType="withEffect">
+                                  <p:stCondLst>
+                                    <p:cond delay="0"/>
+                                  </p:stCondLst>
+                                  <p:childTnLst>
+                                    <p:set>
+                                      <p:cBhvr>
+                                        <p:cTn id="12" dur="1" fill="hold">
+                                          <p:stCondLst>
+                                            <p:cond delay="0"/>
+                                          </p:stCondLst>
+                                        </p:cTn>
+                                        <p:tgtEl>
+                                          <p:spTgt spid="5">
+                                            <p:txEl>
+                                              <p:pRg st="3" end="3"/>
+                                            </p:txEl>
+                                          </p:spTgt>
+                                        </p:tgtEl>
+                                        <p:attrNameLst>
+                                          <p:attrName>style.visibility</p:attrName>
+                                        </p:attrNameLst>
+                                      </p:cBhvr>
+                                      <p:to>
+                                        <p:strVal val="visible"/>
+                                      </p:to>
+                                    </p:set>
+                                  </p:childTnLst>
+                                </p:cTn>
+                              </p:par>
+                            </p:childTnLst>
+                          </p:cTn>
+                        </p:par>
+                      </p:childTnLst>
+                    </p:cTn>
+                  </p:par>
+                  <p:par>
+                    <p:cTn id="13" fill="hold">
+                      <p:stCondLst>
+                        <p:cond delay="indefinite"/>
+                      </p:stCondLst>
+                      <p:childTnLst>
+                        <p:par>
+                          <p:cTn id="14" fill="hold">
+                            <p:stCondLst>
+                              <p:cond delay="0"/>
+                            </p:stCondLst>
+                            <p:childTnLst>
+                              <p:par>
+                                <p:cTn id="15" presetID="1" presetClass="entr" presetSubtype="0" fill="hold" nodeType="clickEffect">
+                                  <p:stCondLst>
+                                    <p:cond delay="0"/>
+                                  </p:stCondLst>
+                                  <p:childTnLst>
+                                    <p:set>
+                                      <p:cBhvr>
+                                        <p:cTn id="16" dur="1" fill="hold">
+                                          <p:stCondLst>
+                                            <p:cond delay="0"/>
+                                          </p:stCondLst>
+                                        </p:cTn>
+                                        <p:tgtEl>
+                                          <p:spTgt spid="5">
+                                            <p:txEl>
+                                              <p:pRg st="4" end="4"/>
+                                            </p:txEl>
+                                          </p:spTgt>
+                                        </p:tgtEl>
+                                        <p:attrNameLst>
+                                          <p:attrName>style.visibility</p:attrName>
+                                        </p:attrNameLst>
+                                      </p:cBhvr>
+                                      <p:to>
+                                        <p:strVal val="visible"/>
+                                      </p:to>
+                                    </p:set>
+                                  </p:childTnLst>
+                                </p:cTn>
+                              </p:par>
+                              <p:par>
+                                <p:cTn id="17" presetID="1" presetClass="entr" presetSubtype="0" fill="hold" nodeType="withEffect">
+                                  <p:stCondLst>
+                                    <p:cond delay="0"/>
+                                  </p:stCondLst>
+                                  <p:childTnLst>
+                                    <p:set>
+                                      <p:cBhvr>
+                                        <p:cTn id="18" dur="1" fill="hold">
+                                          <p:stCondLst>
+                                            <p:cond delay="0"/>
+                                          </p:stCondLst>
+                                        </p:cTn>
+                                        <p:tgtEl>
+                                          <p:spTgt spid="5">
+                                            <p:txEl>
+                                              <p:pRg st="5" end="5"/>
+                                            </p:txEl>
+                                          </p:spTgt>
+                                        </p:tgtEl>
+                                        <p:attrNameLst>
+                                          <p:attrName>style.visibility</p:attrName>
+                                        </p:attrNameLst>
+                                      </p:cBhvr>
+                                      <p:to>
+                                        <p:strVal val="visible"/>
+                                      </p:to>
+                                    </p:set>
+                                  </p:childTnLst>
+                                </p:cTn>
+                              </p:par>
+                              <p:par>
+                                <p:cTn id="19" presetID="1" presetClass="entr" presetSubtype="0" fill="hold" nodeType="withEffect">
+                                  <p:stCondLst>
+                                    <p:cond delay="0"/>
+                                  </p:stCondLst>
+                                  <p:childTnLst>
+                                    <p:set>
+                                      <p:cBhvr>
+                                        <p:cTn id="20" dur="1" fill="hold">
+                                          <p:stCondLst>
+                                            <p:cond delay="0"/>
+                                          </p:stCondLst>
+                                        </p:cTn>
+                                        <p:tgtEl>
+                                          <p:spTgt spid="5">
+                                            <p:txEl>
+                                              <p:pRg st="6" end="6"/>
+                                            </p:txEl>
+                                          </p:spTgt>
+                                        </p:tgtEl>
+                                        <p:attrNameLst>
+                                          <p:attrName>style.visibility</p:attrName>
+                                        </p:attrNameLst>
+                                      </p:cBhvr>
+                                      <p:to>
+                                        <p:strVal val="visible"/>
+                                      </p:to>
+                                    </p:set>
+                                  </p:childTnLst>
+                                </p:cTn>
+                              </p:par>
+                              <p:par>
+                                <p:cTn id="21" presetID="1" presetClass="entr" presetSubtype="0" fill="hold" nodeType="withEffect">
+                                  <p:stCondLst>
+                                    <p:cond delay="0"/>
+                                  </p:stCondLst>
+                                  <p:childTnLst>
+                                    <p:set>
+                                      <p:cBhvr>
+                                        <p:cTn id="22" dur="1" fill="hold">
+                                          <p:stCondLst>
+                                            <p:cond delay="0"/>
+                                          </p:stCondLst>
+                                        </p:cTn>
+                                        <p:tgtEl>
+                                          <p:spTgt spid="5">
+                                            <p:txEl>
+                                              <p:pRg st="7" end="7"/>
+                                            </p:txEl>
+                                          </p:spTgt>
+                                        </p:tgtEl>
+                                        <p:attrNameLst>
+                                          <p:attrName>style.visibility</p:attrName>
+                                        </p:attrNameLst>
+                                      </p:cBhvr>
+                                      <p:to>
+                                        <p:strVal val="visible"/>
+                                      </p:to>
+                                    </p:set>
+                                  </p:childTnLst>
+                                </p:cTn>
+                              </p:par>
+                              <p:par>
+                                <p:cTn id="23" presetID="1" presetClass="entr" presetSubtype="0" fill="hold" nodeType="withEffect">
+                                  <p:stCondLst>
+                                    <p:cond delay="0"/>
+                                  </p:stCondLst>
+                                  <p:childTnLst>
+                                    <p:set>
+                                      <p:cBhvr>
+                                        <p:cTn id="24" dur="1" fill="hold">
+                                          <p:stCondLst>
+                                            <p:cond delay="0"/>
+                                          </p:stCondLst>
+                                        </p:cTn>
+                                        <p:tgtEl>
+                                          <p:spTgt spid="5">
+                                            <p:txEl>
+                                              <p:pRg st="8" end="8"/>
+                                            </p:txEl>
+                                          </p:spTgt>
+                                        </p:tgtEl>
+                                        <p:attrNameLst>
+                                          <p:attrName>style.visibility</p:attrName>
+                                        </p:attrNameLst>
+                                      </p:cBhvr>
+                                      <p:to>
+                                        <p:strVal val="visible"/>
+                                      </p:to>
+                                    </p:set>
+                                  </p:childTnLst>
+                                </p:cTn>
+                              </p:par>
+                              <p:par>
+                                <p:cTn id="25" presetID="1" presetClass="entr" presetSubtype="0" fill="hold" nodeType="withEffect">
+                                  <p:stCondLst>
+                                    <p:cond delay="0"/>
+                                  </p:stCondLst>
+                                  <p:childTnLst>
+                                    <p:set>
+                                      <p:cBhvr>
+                                        <p:cTn id="26" dur="1" fill="hold">
+                                          <p:stCondLst>
+                                            <p:cond delay="0"/>
+                                          </p:stCondLst>
+                                        </p:cTn>
+                                        <p:tgtEl>
+                                          <p:spTgt spid="5">
+                                            <p:txEl>
+                                              <p:pRg st="9" end="9"/>
+                                            </p:txEl>
+                                          </p:spTgt>
+                                        </p:tgtEl>
+                                        <p:attrNameLst>
+                                          <p:attrName>style.visibility</p:attrName>
+                                        </p:attrNameLst>
+                                      </p:cBhvr>
+                                      <p:to>
+                                        <p:strVal val="visible"/>
+                                      </p:to>
+                                    </p:set>
+                                  </p:childTnLst>
+                                </p:cTn>
+                              </p:par>
+                            </p:childTnLst>
+                          </p:cTn>
+                        </p:par>
+                      </p:childTnLst>
+                    </p:cTn>
+                  </p:par>
+                </p:childTnLst>
+              </p:cTn>
+              <p:prevCondLst>
+                <p:cond evt="onPrev" delay="0">
+                  <p:tgtEl>
+                    <p:sldTgt/>
+                  </p:tgtEl>
+                </p:cond>
+              </p:prevCondLst>
+              <p:nextCondLst>
+                <p:cond evt="onNext" delay="0">
+                  <p:tgtEl>
+                    <p:sldTgt/>
+                  </p:tgtEl>
+                </p:cond>
+              </p:nextCondLst>
+            </p:seq>
+          </p:childTnLst>
+        </p:cTn>
+      </p:par>
+    </p:tnLst>
+  </p:timing>
 </p:sld>
 </file>
 
@@ -4994,7 +6264,7 @@
   <p:timing>
     <p:tnLst>
       <p:par>
-        <p:cTn xmlns:p14="http://schemas.microsoft.com/office/powerpoint/2010/main" id="1" dur="indefinite" restart="never" nodeType="tmRoot"/>
+        <p:cTn id="1" dur="indefinite" restart="never" nodeType="tmRoot"/>
       </p:par>
     </p:tnLst>
   </p:timing>
@@ -5155,6 +6425,405 @@
   <p:clrMapOvr>
     <a:masterClrMapping/>
   </p:clrMapOvr>
+  <p:timing>
+    <p:tnLst>
+      <p:par>
+        <p:cTn id="1" dur="indefinite" restart="never" nodeType="tmRoot">
+          <p:childTnLst>
+            <p:seq concurrent="1" nextAc="seek">
+              <p:cTn id="2" dur="indefinite" nodeType="mainSeq">
+                <p:childTnLst>
+                  <p:par>
+                    <p:cTn id="3" fill="hold">
+                      <p:stCondLst>
+                        <p:cond delay="indefinite"/>
+                      </p:stCondLst>
+                      <p:childTnLst>
+                        <p:par>
+                          <p:cTn id="4" fill="hold">
+                            <p:stCondLst>
+                              <p:cond delay="0"/>
+                            </p:stCondLst>
+                            <p:childTnLst>
+                              <p:par>
+                                <p:cTn id="5" presetID="1" presetClass="entr" presetSubtype="0" fill="hold" nodeType="clickEffect">
+                                  <p:stCondLst>
+                                    <p:cond delay="0"/>
+                                  </p:stCondLst>
+                                  <p:childTnLst>
+                                    <p:set>
+                                      <p:cBhvr>
+                                        <p:cTn id="6" dur="1" fill="hold">
+                                          <p:stCondLst>
+                                            <p:cond delay="0"/>
+                                          </p:stCondLst>
+                                        </p:cTn>
+                                        <p:tgtEl>
+                                          <p:spTgt spid="3">
+                                            <p:txEl>
+                                              <p:pRg st="0" end="0"/>
+                                            </p:txEl>
+                                          </p:spTgt>
+                                        </p:tgtEl>
+                                        <p:attrNameLst>
+                                          <p:attrName>style.visibility</p:attrName>
+                                        </p:attrNameLst>
+                                      </p:cBhvr>
+                                      <p:to>
+                                        <p:strVal val="visible"/>
+                                      </p:to>
+                                    </p:set>
+                                  </p:childTnLst>
+                                </p:cTn>
+                              </p:par>
+                              <p:par>
+                                <p:cTn id="7" presetID="1" presetClass="entr" presetSubtype="0" fill="hold" nodeType="withEffect">
+                                  <p:stCondLst>
+                                    <p:cond delay="0"/>
+                                  </p:stCondLst>
+                                  <p:childTnLst>
+                                    <p:set>
+                                      <p:cBhvr>
+                                        <p:cTn id="8" dur="1" fill="hold">
+                                          <p:stCondLst>
+                                            <p:cond delay="0"/>
+                                          </p:stCondLst>
+                                        </p:cTn>
+                                        <p:tgtEl>
+                                          <p:spTgt spid="3">
+                                            <p:txEl>
+                                              <p:pRg st="1" end="1"/>
+                                            </p:txEl>
+                                          </p:spTgt>
+                                        </p:tgtEl>
+                                        <p:attrNameLst>
+                                          <p:attrName>style.visibility</p:attrName>
+                                        </p:attrNameLst>
+                                      </p:cBhvr>
+                                      <p:to>
+                                        <p:strVal val="visible"/>
+                                      </p:to>
+                                    </p:set>
+                                  </p:childTnLst>
+                                </p:cTn>
+                              </p:par>
+                            </p:childTnLst>
+                          </p:cTn>
+                        </p:par>
+                      </p:childTnLst>
+                    </p:cTn>
+                  </p:par>
+                  <p:par>
+                    <p:cTn id="9" fill="hold">
+                      <p:stCondLst>
+                        <p:cond delay="indefinite"/>
+                      </p:stCondLst>
+                      <p:childTnLst>
+                        <p:par>
+                          <p:cTn id="10" fill="hold">
+                            <p:stCondLst>
+                              <p:cond delay="0"/>
+                            </p:stCondLst>
+                            <p:childTnLst>
+                              <p:par>
+                                <p:cTn id="11" presetID="1" presetClass="entr" presetSubtype="0" fill="hold" nodeType="clickEffect">
+                                  <p:stCondLst>
+                                    <p:cond delay="0"/>
+                                  </p:stCondLst>
+                                  <p:childTnLst>
+                                    <p:set>
+                                      <p:cBhvr>
+                                        <p:cTn id="12" dur="1" fill="hold">
+                                          <p:stCondLst>
+                                            <p:cond delay="0"/>
+                                          </p:stCondLst>
+                                        </p:cTn>
+                                        <p:tgtEl>
+                                          <p:spTgt spid="3">
+                                            <p:txEl>
+                                              <p:pRg st="2" end="2"/>
+                                            </p:txEl>
+                                          </p:spTgt>
+                                        </p:tgtEl>
+                                        <p:attrNameLst>
+                                          <p:attrName>style.visibility</p:attrName>
+                                        </p:attrNameLst>
+                                      </p:cBhvr>
+                                      <p:to>
+                                        <p:strVal val="visible"/>
+                                      </p:to>
+                                    </p:set>
+                                  </p:childTnLst>
+                                </p:cTn>
+                              </p:par>
+                              <p:par>
+                                <p:cTn id="13" presetID="1" presetClass="entr" presetSubtype="0" fill="hold" nodeType="withEffect">
+                                  <p:stCondLst>
+                                    <p:cond delay="0"/>
+                                  </p:stCondLst>
+                                  <p:childTnLst>
+                                    <p:set>
+                                      <p:cBhvr>
+                                        <p:cTn id="14" dur="1" fill="hold">
+                                          <p:stCondLst>
+                                            <p:cond delay="0"/>
+                                          </p:stCondLst>
+                                        </p:cTn>
+                                        <p:tgtEl>
+                                          <p:spTgt spid="3">
+                                            <p:txEl>
+                                              <p:pRg st="3" end="3"/>
+                                            </p:txEl>
+                                          </p:spTgt>
+                                        </p:tgtEl>
+                                        <p:attrNameLst>
+                                          <p:attrName>style.visibility</p:attrName>
+                                        </p:attrNameLst>
+                                      </p:cBhvr>
+                                      <p:to>
+                                        <p:strVal val="visible"/>
+                                      </p:to>
+                                    </p:set>
+                                  </p:childTnLst>
+                                </p:cTn>
+                              </p:par>
+                            </p:childTnLst>
+                          </p:cTn>
+                        </p:par>
+                      </p:childTnLst>
+                    </p:cTn>
+                  </p:par>
+                  <p:par>
+                    <p:cTn id="15" fill="hold">
+                      <p:stCondLst>
+                        <p:cond delay="indefinite"/>
+                      </p:stCondLst>
+                      <p:childTnLst>
+                        <p:par>
+                          <p:cTn id="16" fill="hold">
+                            <p:stCondLst>
+                              <p:cond delay="0"/>
+                            </p:stCondLst>
+                            <p:childTnLst>
+                              <p:par>
+                                <p:cTn id="17" presetID="1" presetClass="entr" presetSubtype="0" fill="hold" nodeType="clickEffect">
+                                  <p:stCondLst>
+                                    <p:cond delay="0"/>
+                                  </p:stCondLst>
+                                  <p:childTnLst>
+                                    <p:set>
+                                      <p:cBhvr>
+                                        <p:cTn id="18" dur="1" fill="hold">
+                                          <p:stCondLst>
+                                            <p:cond delay="0"/>
+                                          </p:stCondLst>
+                                        </p:cTn>
+                                        <p:tgtEl>
+                                          <p:spTgt spid="3">
+                                            <p:txEl>
+                                              <p:pRg st="4" end="4"/>
+                                            </p:txEl>
+                                          </p:spTgt>
+                                        </p:tgtEl>
+                                        <p:attrNameLst>
+                                          <p:attrName>style.visibility</p:attrName>
+                                        </p:attrNameLst>
+                                      </p:cBhvr>
+                                      <p:to>
+                                        <p:strVal val="visible"/>
+                                      </p:to>
+                                    </p:set>
+                                  </p:childTnLst>
+                                </p:cTn>
+                              </p:par>
+                            </p:childTnLst>
+                          </p:cTn>
+                        </p:par>
+                      </p:childTnLst>
+                    </p:cTn>
+                  </p:par>
+                  <p:par>
+                    <p:cTn id="19" fill="hold">
+                      <p:stCondLst>
+                        <p:cond delay="indefinite"/>
+                      </p:stCondLst>
+                      <p:childTnLst>
+                        <p:par>
+                          <p:cTn id="20" fill="hold">
+                            <p:stCondLst>
+                              <p:cond delay="0"/>
+                            </p:stCondLst>
+                            <p:childTnLst>
+                              <p:par>
+                                <p:cTn id="21" presetID="1" presetClass="entr" presetSubtype="0" fill="hold" nodeType="clickEffect">
+                                  <p:stCondLst>
+                                    <p:cond delay="0"/>
+                                  </p:stCondLst>
+                                  <p:childTnLst>
+                                    <p:set>
+                                      <p:cBhvr>
+                                        <p:cTn id="22" dur="1" fill="hold">
+                                          <p:stCondLst>
+                                            <p:cond delay="0"/>
+                                          </p:stCondLst>
+                                        </p:cTn>
+                                        <p:tgtEl>
+                                          <p:spTgt spid="3">
+                                            <p:txEl>
+                                              <p:pRg st="5" end="5"/>
+                                            </p:txEl>
+                                          </p:spTgt>
+                                        </p:tgtEl>
+                                        <p:attrNameLst>
+                                          <p:attrName>style.visibility</p:attrName>
+                                        </p:attrNameLst>
+                                      </p:cBhvr>
+                                      <p:to>
+                                        <p:strVal val="visible"/>
+                                      </p:to>
+                                    </p:set>
+                                  </p:childTnLst>
+                                </p:cTn>
+                              </p:par>
+                              <p:par>
+                                <p:cTn id="23" presetID="1" presetClass="entr" presetSubtype="0" fill="hold" nodeType="withEffect">
+                                  <p:stCondLst>
+                                    <p:cond delay="0"/>
+                                  </p:stCondLst>
+                                  <p:childTnLst>
+                                    <p:set>
+                                      <p:cBhvr>
+                                        <p:cTn id="24" dur="1" fill="hold">
+                                          <p:stCondLst>
+                                            <p:cond delay="0"/>
+                                          </p:stCondLst>
+                                        </p:cTn>
+                                        <p:tgtEl>
+                                          <p:spTgt spid="3">
+                                            <p:txEl>
+                                              <p:pRg st="6" end="6"/>
+                                            </p:txEl>
+                                          </p:spTgt>
+                                        </p:tgtEl>
+                                        <p:attrNameLst>
+                                          <p:attrName>style.visibility</p:attrName>
+                                        </p:attrNameLst>
+                                      </p:cBhvr>
+                                      <p:to>
+                                        <p:strVal val="visible"/>
+                                      </p:to>
+                                    </p:set>
+                                  </p:childTnLst>
+                                </p:cTn>
+                              </p:par>
+                            </p:childTnLst>
+                          </p:cTn>
+                        </p:par>
+                      </p:childTnLst>
+                    </p:cTn>
+                  </p:par>
+                  <p:par>
+                    <p:cTn id="25" fill="hold">
+                      <p:stCondLst>
+                        <p:cond delay="indefinite"/>
+                      </p:stCondLst>
+                      <p:childTnLst>
+                        <p:par>
+                          <p:cTn id="26" fill="hold">
+                            <p:stCondLst>
+                              <p:cond delay="0"/>
+                            </p:stCondLst>
+                            <p:childTnLst>
+                              <p:par>
+                                <p:cTn id="27" presetID="1" presetClass="entr" presetSubtype="0" fill="hold" nodeType="clickEffect">
+                                  <p:stCondLst>
+                                    <p:cond delay="0"/>
+                                  </p:stCondLst>
+                                  <p:childTnLst>
+                                    <p:set>
+                                      <p:cBhvr>
+                                        <p:cTn id="28" dur="1" fill="hold">
+                                          <p:stCondLst>
+                                            <p:cond delay="0"/>
+                                          </p:stCondLst>
+                                        </p:cTn>
+                                        <p:tgtEl>
+                                          <p:spTgt spid="3">
+                                            <p:txEl>
+                                              <p:pRg st="7" end="7"/>
+                                            </p:txEl>
+                                          </p:spTgt>
+                                        </p:tgtEl>
+                                        <p:attrNameLst>
+                                          <p:attrName>style.visibility</p:attrName>
+                                        </p:attrNameLst>
+                                      </p:cBhvr>
+                                      <p:to>
+                                        <p:strVal val="visible"/>
+                                      </p:to>
+                                    </p:set>
+                                  </p:childTnLst>
+                                </p:cTn>
+                              </p:par>
+                              <p:par>
+                                <p:cTn id="29" presetID="1" presetClass="entr" presetSubtype="0" fill="hold" nodeType="withEffect">
+                                  <p:stCondLst>
+                                    <p:cond delay="0"/>
+                                  </p:stCondLst>
+                                  <p:childTnLst>
+                                    <p:set>
+                                      <p:cBhvr>
+                                        <p:cTn id="30" dur="1" fill="hold">
+                                          <p:stCondLst>
+                                            <p:cond delay="0"/>
+                                          </p:stCondLst>
+                                        </p:cTn>
+                                        <p:tgtEl>
+                                          <p:spTgt spid="3">
+                                            <p:txEl>
+                                              <p:pRg st="8" end="8"/>
+                                            </p:txEl>
+                                          </p:spTgt>
+                                        </p:tgtEl>
+                                        <p:attrNameLst>
+                                          <p:attrName>style.visibility</p:attrName>
+                                        </p:attrNameLst>
+                                      </p:cBhvr>
+                                      <p:to>
+                                        <p:strVal val="visible"/>
+                                      </p:to>
+                                    </p:set>
+                                  </p:childTnLst>
+                                </p:cTn>
+                              </p:par>
+                            </p:childTnLst>
+                          </p:cTn>
+                        </p:par>
+                      </p:childTnLst>
+                    </p:cTn>
+                  </p:par>
+                </p:childTnLst>
+              </p:cTn>
+              <p:prevCondLst>
+                <p:cond evt="onPrev" delay="0">
+                  <p:tgtEl>
+                    <p:sldTgt/>
+                  </p:tgtEl>
+                </p:cond>
+              </p:prevCondLst>
+              <p:nextCondLst>
+                <p:cond evt="onNext" delay="0">
+                  <p:tgtEl>
+                    <p:sldTgt/>
+                  </p:tgtEl>
+                </p:cond>
+              </p:nextCondLst>
+            </p:seq>
+          </p:childTnLst>
+        </p:cTn>
+      </p:par>
+    </p:tnLst>
+  </p:timing>
 </p:sld>
 </file>
 
@@ -5198,11 +6867,7 @@
             </a:r>
             <a:r>
               <a:rPr lang="en-US" smtClean="0"/>
-              <a:t>High </a:t>
-            </a:r>
-            <a:r>
-              <a:rPr lang="en-US" smtClean="0"/>
-              <a:t>Throughput </a:t>
+              <a:t>High Throughput </a:t>
             </a:r>
             <a:r>
               <a:rPr lang="en-US" dirty="0" smtClean="0"/>
@@ -5296,6 +6961,13 @@
   <p:clrMapOvr>
     <a:masterClrMapping/>
   </p:clrMapOvr>
+  <p:timing>
+    <p:tnLst>
+      <p:par>
+        <p:cTn id="1" dur="indefinite" restart="never" nodeType="tmRoot"/>
+      </p:par>
+    </p:tnLst>
+  </p:timing>
 </p:sld>
 </file>
 
@@ -5442,7 +7114,7 @@
   <p:timing>
     <p:tnLst>
       <p:par>
-        <p:cTn xmlns:p14="http://schemas.microsoft.com/office/powerpoint/2010/main" id="1" dur="indefinite" restart="never" nodeType="tmRoot"/>
+        <p:cTn id="1" dur="indefinite" restart="never" nodeType="tmRoot"/>
       </p:par>
     </p:tnLst>
   </p:timing>
@@ -5590,7 +7262,275 @@
   <p:timing>
     <p:tnLst>
       <p:par>
-        <p:cTn xmlns:p14="http://schemas.microsoft.com/office/powerpoint/2010/main" id="1" dur="indefinite" restart="never" nodeType="tmRoot"/>
+        <p:cTn id="1" dur="indefinite" restart="never" nodeType="tmRoot">
+          <p:childTnLst>
+            <p:seq concurrent="1" nextAc="seek">
+              <p:cTn id="2" dur="indefinite" nodeType="mainSeq">
+                <p:childTnLst>
+                  <p:par>
+                    <p:cTn id="3" fill="hold">
+                      <p:stCondLst>
+                        <p:cond delay="indefinite"/>
+                      </p:stCondLst>
+                      <p:childTnLst>
+                        <p:par>
+                          <p:cTn id="4" fill="hold">
+                            <p:stCondLst>
+                              <p:cond delay="0"/>
+                            </p:stCondLst>
+                            <p:childTnLst>
+                              <p:par>
+                                <p:cTn id="5" presetID="1" presetClass="entr" presetSubtype="0" fill="hold" nodeType="clickEffect">
+                                  <p:stCondLst>
+                                    <p:cond delay="0"/>
+                                  </p:stCondLst>
+                                  <p:childTnLst>
+                                    <p:set>
+                                      <p:cBhvr>
+                                        <p:cTn id="6" dur="1" fill="hold">
+                                          <p:stCondLst>
+                                            <p:cond delay="0"/>
+                                          </p:stCondLst>
+                                        </p:cTn>
+                                        <p:tgtEl>
+                                          <p:spTgt spid="3">
+                                            <p:txEl>
+                                              <p:pRg st="0" end="0"/>
+                                            </p:txEl>
+                                          </p:spTgt>
+                                        </p:tgtEl>
+                                        <p:attrNameLst>
+                                          <p:attrName>style.visibility</p:attrName>
+                                        </p:attrNameLst>
+                                      </p:cBhvr>
+                                      <p:to>
+                                        <p:strVal val="visible"/>
+                                      </p:to>
+                                    </p:set>
+                                  </p:childTnLst>
+                                </p:cTn>
+                              </p:par>
+                            </p:childTnLst>
+                          </p:cTn>
+                        </p:par>
+                      </p:childTnLst>
+                    </p:cTn>
+                  </p:par>
+                  <p:par>
+                    <p:cTn id="7" fill="hold">
+                      <p:stCondLst>
+                        <p:cond delay="indefinite"/>
+                      </p:stCondLst>
+                      <p:childTnLst>
+                        <p:par>
+                          <p:cTn id="8" fill="hold">
+                            <p:stCondLst>
+                              <p:cond delay="0"/>
+                            </p:stCondLst>
+                            <p:childTnLst>
+                              <p:par>
+                                <p:cTn id="9" presetID="1" presetClass="entr" presetSubtype="0" fill="hold" nodeType="clickEffect">
+                                  <p:stCondLst>
+                                    <p:cond delay="0"/>
+                                  </p:stCondLst>
+                                  <p:childTnLst>
+                                    <p:set>
+                                      <p:cBhvr>
+                                        <p:cTn id="10" dur="1" fill="hold">
+                                          <p:stCondLst>
+                                            <p:cond delay="0"/>
+                                          </p:stCondLst>
+                                        </p:cTn>
+                                        <p:tgtEl>
+                                          <p:spTgt spid="3">
+                                            <p:txEl>
+                                              <p:pRg st="1" end="1"/>
+                                            </p:txEl>
+                                          </p:spTgt>
+                                        </p:tgtEl>
+                                        <p:attrNameLst>
+                                          <p:attrName>style.visibility</p:attrName>
+                                        </p:attrNameLst>
+                                      </p:cBhvr>
+                                      <p:to>
+                                        <p:strVal val="visible"/>
+                                      </p:to>
+                                    </p:set>
+                                  </p:childTnLst>
+                                </p:cTn>
+                              </p:par>
+                            </p:childTnLst>
+                          </p:cTn>
+                        </p:par>
+                      </p:childTnLst>
+                    </p:cTn>
+                  </p:par>
+                  <p:par>
+                    <p:cTn id="11" fill="hold">
+                      <p:stCondLst>
+                        <p:cond delay="indefinite"/>
+                      </p:stCondLst>
+                      <p:childTnLst>
+                        <p:par>
+                          <p:cTn id="12" fill="hold">
+                            <p:stCondLst>
+                              <p:cond delay="0"/>
+                            </p:stCondLst>
+                            <p:childTnLst>
+                              <p:par>
+                                <p:cTn id="13" presetID="1" presetClass="entr" presetSubtype="0" fill="hold" nodeType="clickEffect">
+                                  <p:stCondLst>
+                                    <p:cond delay="0"/>
+                                  </p:stCondLst>
+                                  <p:childTnLst>
+                                    <p:set>
+                                      <p:cBhvr>
+                                        <p:cTn id="14" dur="1" fill="hold">
+                                          <p:stCondLst>
+                                            <p:cond delay="0"/>
+                                          </p:stCondLst>
+                                        </p:cTn>
+                                        <p:tgtEl>
+                                          <p:spTgt spid="3">
+                                            <p:txEl>
+                                              <p:pRg st="2" end="2"/>
+                                            </p:txEl>
+                                          </p:spTgt>
+                                        </p:tgtEl>
+                                        <p:attrNameLst>
+                                          <p:attrName>style.visibility</p:attrName>
+                                        </p:attrNameLst>
+                                      </p:cBhvr>
+                                      <p:to>
+                                        <p:strVal val="visible"/>
+                                      </p:to>
+                                    </p:set>
+                                  </p:childTnLst>
+                                </p:cTn>
+                              </p:par>
+                            </p:childTnLst>
+                          </p:cTn>
+                        </p:par>
+                      </p:childTnLst>
+                    </p:cTn>
+                  </p:par>
+                  <p:par>
+                    <p:cTn id="15" fill="hold">
+                      <p:stCondLst>
+                        <p:cond delay="indefinite"/>
+                      </p:stCondLst>
+                      <p:childTnLst>
+                        <p:par>
+                          <p:cTn id="16" fill="hold">
+                            <p:stCondLst>
+                              <p:cond delay="0"/>
+                            </p:stCondLst>
+                            <p:childTnLst>
+                              <p:par>
+                                <p:cTn id="17" presetID="1" presetClass="entr" presetSubtype="0" fill="hold" nodeType="clickEffect">
+                                  <p:stCondLst>
+                                    <p:cond delay="0"/>
+                                  </p:stCondLst>
+                                  <p:childTnLst>
+                                    <p:set>
+                                      <p:cBhvr>
+                                        <p:cTn id="18" dur="1" fill="hold">
+                                          <p:stCondLst>
+                                            <p:cond delay="0"/>
+                                          </p:stCondLst>
+                                        </p:cTn>
+                                        <p:tgtEl>
+                                          <p:spTgt spid="3">
+                                            <p:txEl>
+                                              <p:pRg st="3" end="3"/>
+                                            </p:txEl>
+                                          </p:spTgt>
+                                        </p:tgtEl>
+                                        <p:attrNameLst>
+                                          <p:attrName>style.visibility</p:attrName>
+                                        </p:attrNameLst>
+                                      </p:cBhvr>
+                                      <p:to>
+                                        <p:strVal val="visible"/>
+                                      </p:to>
+                                    </p:set>
+                                  </p:childTnLst>
+                                </p:cTn>
+                              </p:par>
+                            </p:childTnLst>
+                          </p:cTn>
+                        </p:par>
+                      </p:childTnLst>
+                    </p:cTn>
+                  </p:par>
+                  <p:par>
+                    <p:cTn id="19" fill="hold">
+                      <p:stCondLst>
+                        <p:cond delay="indefinite"/>
+                      </p:stCondLst>
+                      <p:childTnLst>
+                        <p:par>
+                          <p:cTn id="20" fill="hold">
+                            <p:stCondLst>
+                              <p:cond delay="0"/>
+                            </p:stCondLst>
+                            <p:childTnLst>
+                              <p:par>
+                                <p:cTn id="21" presetID="1" presetClass="entr" presetSubtype="0" fill="hold" nodeType="clickEffect">
+                                  <p:stCondLst>
+                                    <p:cond delay="0"/>
+                                  </p:stCondLst>
+                                  <p:childTnLst>
+                                    <p:set>
+                                      <p:cBhvr>
+                                        <p:cTn id="22" dur="1" fill="hold">
+                                          <p:stCondLst>
+                                            <p:cond delay="0"/>
+                                          </p:stCondLst>
+                                        </p:cTn>
+                                        <p:tgtEl>
+                                          <p:spTgt spid="3">
+                                            <p:txEl>
+                                              <p:pRg st="4" end="4"/>
+                                            </p:txEl>
+                                          </p:spTgt>
+                                        </p:tgtEl>
+                                        <p:attrNameLst>
+                                          <p:attrName>style.visibility</p:attrName>
+                                        </p:attrNameLst>
+                                      </p:cBhvr>
+                                      <p:to>
+                                        <p:strVal val="visible"/>
+                                      </p:to>
+                                    </p:set>
+                                  </p:childTnLst>
+                                </p:cTn>
+                              </p:par>
+                            </p:childTnLst>
+                          </p:cTn>
+                        </p:par>
+                      </p:childTnLst>
+                    </p:cTn>
+                  </p:par>
+                </p:childTnLst>
+              </p:cTn>
+              <p:prevCondLst>
+                <p:cond evt="onPrev" delay="0">
+                  <p:tgtEl>
+                    <p:sldTgt/>
+                  </p:tgtEl>
+                </p:cond>
+              </p:prevCondLst>
+              <p:nextCondLst>
+                <p:cond evt="onNext" delay="0">
+                  <p:tgtEl>
+                    <p:sldTgt/>
+                  </p:tgtEl>
+                </p:cond>
+              </p:nextCondLst>
+            </p:seq>
+          </p:childTnLst>
+        </p:cTn>
       </p:par>
     </p:tnLst>
   </p:timing>

</xml_diff>